<commit_message>
importerat i pp så typing funkar
</commit_message>
<xml_diff>
--- a/powerpointer/matchrapporter/20220930 IK Sirius - Villa Lidköping halvlek 1 .pptx
+++ b/powerpointer/matchrapporter/20220930 IK Sirius - Villa Lidköping halvlek 1 .pptx
@@ -5,13 +5,13 @@
     <p:sldMasterId id="2147483648" r:id="rId1"/>
   </p:sldMasterIdLst>
   <p:sldIdLst>
-    <p:sldId id="256" r:id="rId2"/>
-    <p:sldId id="257" r:id="rId3"/>
-    <p:sldId id="258" r:id="rId4"/>
-    <p:sldId id="259" r:id="rId5"/>
-    <p:sldId id="260" r:id="rId6"/>
-    <p:sldId id="261" r:id="rId7"/>
-    <p:sldId id="262" r:id="rId8"/>
+    <p:sldId id="256" r:id="rId7"/>
+    <p:sldId id="257" r:id="rId8"/>
+    <p:sldId id="258" r:id="rId9"/>
+    <p:sldId id="259" r:id="rId10"/>
+    <p:sldId id="260" r:id="rId11"/>
+    <p:sldId id="261" r:id="rId12"/>
+    <p:sldId id="262" r:id="rId13"/>
   </p:sldIdLst>
   <p:sldSz cx="9144000" cy="6858000" type="screen4x3"/>
   <p:notesSz cx="6858000" cy="9144000"/>
@@ -110,22 +110,6 @@
       </a:defRPr>
     </a:lvl9pPr>
   </p:defaultTextStyle>
-  <p:extLst>
-    <p:ext uri="{EFAFB233-063F-42B5-8137-9DF3F51BA10A}">
-      <p15:sldGuideLst xmlns:p15="http://schemas.microsoft.com/office/powerpoint/2012/main">
-        <p15:guide id="1" orient="horz" pos="2160">
-          <p15:clr>
-            <a:srgbClr val="A4A3A4"/>
-          </p15:clr>
-        </p15:guide>
-        <p15:guide id="2" pos="2880">
-          <p15:clr>
-            <a:srgbClr val="A4A3A4"/>
-          </p15:clr>
-        </p15:guide>
-      </p15:sldGuideLst>
-    </p:ext>
-  </p:extLst>
 </p:presentation>
 </file>
 
@@ -167,9 +151,10 @@
           <a:lstStyle/>
           <a:p>
             <a:r>
-              <a:rPr lang="en-US"/>
+              <a:rPr lang="en-US" smtClean="0"/>
               <a:t>Click to edit Master title style</a:t>
             </a:r>
+            <a:endParaRPr lang="en-US"/>
           </a:p>
         </p:txBody>
       </p:sp>
@@ -285,9 +270,10 @@
           </a:lstStyle>
           <a:p>
             <a:r>
-              <a:rPr lang="en-US"/>
+              <a:rPr lang="en-US" smtClean="0"/>
               <a:t>Click to edit Master subtitle style</a:t>
             </a:r>
+            <a:endParaRPr lang="en-US"/>
           </a:p>
         </p:txBody>
       </p:sp>
@@ -308,7 +294,7 @@
           <a:p>
             <a:fld id="{5BCAD085-E8A6-8845-BD4E-CB4CCA059FC4}" type="datetimeFigureOut">
               <a:rPr lang="en-US" smtClean="0"/>
-              <a:t>10/25/2022</a:t>
+              <a:t>1/27/13</a:t>
             </a:fld>
             <a:endParaRPr lang="en-US"/>
           </a:p>
@@ -402,9 +388,10 @@
           <a:lstStyle/>
           <a:p>
             <a:r>
-              <a:rPr lang="en-US"/>
+              <a:rPr lang="en-US" smtClean="0"/>
               <a:t>Click to edit Master title style</a:t>
             </a:r>
+            <a:endParaRPr lang="en-US"/>
           </a:p>
         </p:txBody>
       </p:sp>
@@ -425,37 +412,38 @@
           <a:p>
             <a:pPr lvl="0"/>
             <a:r>
-              <a:rPr lang="en-US"/>
+              <a:rPr lang="en-US" smtClean="0"/>
               <a:t>Click to edit Master text styles</a:t>
             </a:r>
           </a:p>
           <a:p>
             <a:pPr lvl="1"/>
             <a:r>
-              <a:rPr lang="en-US"/>
+              <a:rPr lang="en-US" smtClean="0"/>
               <a:t>Second level</a:t>
             </a:r>
           </a:p>
           <a:p>
             <a:pPr lvl="2"/>
             <a:r>
-              <a:rPr lang="en-US"/>
+              <a:rPr lang="en-US" smtClean="0"/>
               <a:t>Third level</a:t>
             </a:r>
           </a:p>
           <a:p>
             <a:pPr lvl="3"/>
             <a:r>
-              <a:rPr lang="en-US"/>
+              <a:rPr lang="en-US" smtClean="0"/>
               <a:t>Fourth level</a:t>
             </a:r>
           </a:p>
           <a:p>
             <a:pPr lvl="4"/>
             <a:r>
-              <a:rPr lang="en-US"/>
+              <a:rPr lang="en-US" smtClean="0"/>
               <a:t>Fifth level</a:t>
             </a:r>
+            <a:endParaRPr lang="en-US"/>
           </a:p>
         </p:txBody>
       </p:sp>
@@ -476,7 +464,7 @@
           <a:p>
             <a:fld id="{5BCAD085-E8A6-8845-BD4E-CB4CCA059FC4}" type="datetimeFigureOut">
               <a:rPr lang="en-US" smtClean="0"/>
-              <a:t>10/25/2022</a:t>
+              <a:t>1/27/13</a:t>
             </a:fld>
             <a:endParaRPr lang="en-US"/>
           </a:p>
@@ -575,9 +563,10 @@
           <a:lstStyle/>
           <a:p>
             <a:r>
-              <a:rPr lang="en-US"/>
+              <a:rPr lang="en-US" smtClean="0"/>
               <a:t>Click to edit Master title style</a:t>
             </a:r>
+            <a:endParaRPr lang="en-US"/>
           </a:p>
         </p:txBody>
       </p:sp>
@@ -603,37 +592,38 @@
           <a:p>
             <a:pPr lvl="0"/>
             <a:r>
-              <a:rPr lang="en-US"/>
+              <a:rPr lang="en-US" smtClean="0"/>
               <a:t>Click to edit Master text styles</a:t>
             </a:r>
           </a:p>
           <a:p>
             <a:pPr lvl="1"/>
             <a:r>
-              <a:rPr lang="en-US"/>
+              <a:rPr lang="en-US" smtClean="0"/>
               <a:t>Second level</a:t>
             </a:r>
           </a:p>
           <a:p>
             <a:pPr lvl="2"/>
             <a:r>
-              <a:rPr lang="en-US"/>
+              <a:rPr lang="en-US" smtClean="0"/>
               <a:t>Third level</a:t>
             </a:r>
           </a:p>
           <a:p>
             <a:pPr lvl="3"/>
             <a:r>
-              <a:rPr lang="en-US"/>
+              <a:rPr lang="en-US" smtClean="0"/>
               <a:t>Fourth level</a:t>
             </a:r>
           </a:p>
           <a:p>
             <a:pPr lvl="4"/>
             <a:r>
-              <a:rPr lang="en-US"/>
+              <a:rPr lang="en-US" smtClean="0"/>
               <a:t>Fifth level</a:t>
             </a:r>
+            <a:endParaRPr lang="en-US"/>
           </a:p>
         </p:txBody>
       </p:sp>
@@ -654,7 +644,7 @@
           <a:p>
             <a:fld id="{5BCAD085-E8A6-8845-BD4E-CB4CCA059FC4}" type="datetimeFigureOut">
               <a:rPr lang="en-US" smtClean="0"/>
-              <a:t>10/25/2022</a:t>
+              <a:t>1/27/13</a:t>
             </a:fld>
             <a:endParaRPr lang="en-US"/>
           </a:p>
@@ -748,9 +738,10 @@
           <a:lstStyle/>
           <a:p>
             <a:r>
-              <a:rPr lang="en-US"/>
+              <a:rPr lang="en-US" smtClean="0"/>
               <a:t>Click to edit Master title style</a:t>
             </a:r>
+            <a:endParaRPr lang="en-US"/>
           </a:p>
         </p:txBody>
       </p:sp>
@@ -771,37 +762,38 @@
           <a:p>
             <a:pPr lvl="0"/>
             <a:r>
-              <a:rPr lang="en-US"/>
+              <a:rPr lang="en-US" smtClean="0"/>
               <a:t>Click to edit Master text styles</a:t>
             </a:r>
           </a:p>
           <a:p>
             <a:pPr lvl="1"/>
             <a:r>
-              <a:rPr lang="en-US"/>
+              <a:rPr lang="en-US" smtClean="0"/>
               <a:t>Second level</a:t>
             </a:r>
           </a:p>
           <a:p>
             <a:pPr lvl="2"/>
             <a:r>
-              <a:rPr lang="en-US"/>
+              <a:rPr lang="en-US" smtClean="0"/>
               <a:t>Third level</a:t>
             </a:r>
           </a:p>
           <a:p>
             <a:pPr lvl="3"/>
             <a:r>
-              <a:rPr lang="en-US"/>
+              <a:rPr lang="en-US" smtClean="0"/>
               <a:t>Fourth level</a:t>
             </a:r>
           </a:p>
           <a:p>
             <a:pPr lvl="4"/>
             <a:r>
-              <a:rPr lang="en-US"/>
+              <a:rPr lang="en-US" smtClean="0"/>
               <a:t>Fifth level</a:t>
             </a:r>
+            <a:endParaRPr lang="en-US"/>
           </a:p>
         </p:txBody>
       </p:sp>
@@ -822,7 +814,7 @@
           <a:p>
             <a:fld id="{5BCAD085-E8A6-8845-BD4E-CB4CCA059FC4}" type="datetimeFigureOut">
               <a:rPr lang="en-US" smtClean="0"/>
-              <a:t>10/25/2022</a:t>
+              <a:t>1/27/13</a:t>
             </a:fld>
             <a:endParaRPr lang="en-US"/>
           </a:p>
@@ -925,9 +917,10 @@
           </a:lstStyle>
           <a:p>
             <a:r>
-              <a:rPr lang="en-US"/>
+              <a:rPr lang="en-US" smtClean="0"/>
               <a:t>Click to edit Master title style</a:t>
             </a:r>
+            <a:endParaRPr lang="en-US"/>
           </a:p>
         </p:txBody>
       </p:sp>
@@ -1044,7 +1037,7 @@
           <a:p>
             <a:pPr lvl="0"/>
             <a:r>
-              <a:rPr lang="en-US"/>
+              <a:rPr lang="en-US" smtClean="0"/>
               <a:t>Click to edit Master text styles</a:t>
             </a:r>
           </a:p>
@@ -1067,7 +1060,7 @@
           <a:p>
             <a:fld id="{5BCAD085-E8A6-8845-BD4E-CB4CCA059FC4}" type="datetimeFigureOut">
               <a:rPr lang="en-US" smtClean="0"/>
-              <a:t>10/25/2022</a:t>
+              <a:t>1/27/13</a:t>
             </a:fld>
             <a:endParaRPr lang="en-US"/>
           </a:p>
@@ -1161,9 +1154,10 @@
           <a:lstStyle/>
           <a:p>
             <a:r>
-              <a:rPr lang="en-US"/>
+              <a:rPr lang="en-US" smtClean="0"/>
               <a:t>Click to edit Master title style</a:t>
             </a:r>
+            <a:endParaRPr lang="en-US"/>
           </a:p>
         </p:txBody>
       </p:sp>
@@ -1217,37 +1211,38 @@
           <a:p>
             <a:pPr lvl="0"/>
             <a:r>
-              <a:rPr lang="en-US"/>
+              <a:rPr lang="en-US" smtClean="0"/>
               <a:t>Click to edit Master text styles</a:t>
             </a:r>
           </a:p>
           <a:p>
             <a:pPr lvl="1"/>
             <a:r>
-              <a:rPr lang="en-US"/>
+              <a:rPr lang="en-US" smtClean="0"/>
               <a:t>Second level</a:t>
             </a:r>
           </a:p>
           <a:p>
             <a:pPr lvl="2"/>
             <a:r>
-              <a:rPr lang="en-US"/>
+              <a:rPr lang="en-US" smtClean="0"/>
               <a:t>Third level</a:t>
             </a:r>
           </a:p>
           <a:p>
             <a:pPr lvl="3"/>
             <a:r>
-              <a:rPr lang="en-US"/>
+              <a:rPr lang="en-US" smtClean="0"/>
               <a:t>Fourth level</a:t>
             </a:r>
           </a:p>
           <a:p>
             <a:pPr lvl="4"/>
             <a:r>
-              <a:rPr lang="en-US"/>
+              <a:rPr lang="en-US" smtClean="0"/>
               <a:t>Fifth level</a:t>
             </a:r>
+            <a:endParaRPr lang="en-US"/>
           </a:p>
         </p:txBody>
       </p:sp>
@@ -1301,37 +1296,38 @@
           <a:p>
             <a:pPr lvl="0"/>
             <a:r>
-              <a:rPr lang="en-US"/>
+              <a:rPr lang="en-US" smtClean="0"/>
               <a:t>Click to edit Master text styles</a:t>
             </a:r>
           </a:p>
           <a:p>
             <a:pPr lvl="1"/>
             <a:r>
-              <a:rPr lang="en-US"/>
+              <a:rPr lang="en-US" smtClean="0"/>
               <a:t>Second level</a:t>
             </a:r>
           </a:p>
           <a:p>
             <a:pPr lvl="2"/>
             <a:r>
-              <a:rPr lang="en-US"/>
+              <a:rPr lang="en-US" smtClean="0"/>
               <a:t>Third level</a:t>
             </a:r>
           </a:p>
           <a:p>
             <a:pPr lvl="3"/>
             <a:r>
-              <a:rPr lang="en-US"/>
+              <a:rPr lang="en-US" smtClean="0"/>
               <a:t>Fourth level</a:t>
             </a:r>
           </a:p>
           <a:p>
             <a:pPr lvl="4"/>
             <a:r>
-              <a:rPr lang="en-US"/>
+              <a:rPr lang="en-US" smtClean="0"/>
               <a:t>Fifth level</a:t>
             </a:r>
+            <a:endParaRPr lang="en-US"/>
           </a:p>
         </p:txBody>
       </p:sp>
@@ -1352,7 +1348,7 @@
           <a:p>
             <a:fld id="{5BCAD085-E8A6-8845-BD4E-CB4CCA059FC4}" type="datetimeFigureOut">
               <a:rPr lang="en-US" smtClean="0"/>
-              <a:t>10/25/2022</a:t>
+              <a:t>1/27/13</a:t>
             </a:fld>
             <a:endParaRPr lang="en-US"/>
           </a:p>
@@ -1450,9 +1446,10 @@
           </a:lstStyle>
           <a:p>
             <a:r>
-              <a:rPr lang="en-US"/>
+              <a:rPr lang="en-US" smtClean="0"/>
               <a:t>Click to edit Master title style</a:t>
             </a:r>
+            <a:endParaRPr lang="en-US"/>
           </a:p>
         </p:txBody>
       </p:sp>
@@ -1515,7 +1512,7 @@
           <a:p>
             <a:pPr lvl="0"/>
             <a:r>
-              <a:rPr lang="en-US"/>
+              <a:rPr lang="en-US" smtClean="0"/>
               <a:t>Click to edit Master text styles</a:t>
             </a:r>
           </a:p>
@@ -1571,37 +1568,38 @@
           <a:p>
             <a:pPr lvl="0"/>
             <a:r>
-              <a:rPr lang="en-US"/>
+              <a:rPr lang="en-US" smtClean="0"/>
               <a:t>Click to edit Master text styles</a:t>
             </a:r>
           </a:p>
           <a:p>
             <a:pPr lvl="1"/>
             <a:r>
-              <a:rPr lang="en-US"/>
+              <a:rPr lang="en-US" smtClean="0"/>
               <a:t>Second level</a:t>
             </a:r>
           </a:p>
           <a:p>
             <a:pPr lvl="2"/>
             <a:r>
-              <a:rPr lang="en-US"/>
+              <a:rPr lang="en-US" smtClean="0"/>
               <a:t>Third level</a:t>
             </a:r>
           </a:p>
           <a:p>
             <a:pPr lvl="3"/>
             <a:r>
-              <a:rPr lang="en-US"/>
+              <a:rPr lang="en-US" smtClean="0"/>
               <a:t>Fourth level</a:t>
             </a:r>
           </a:p>
           <a:p>
             <a:pPr lvl="4"/>
             <a:r>
-              <a:rPr lang="en-US"/>
+              <a:rPr lang="en-US" smtClean="0"/>
               <a:t>Fifth level</a:t>
             </a:r>
+            <a:endParaRPr lang="en-US"/>
           </a:p>
         </p:txBody>
       </p:sp>
@@ -1664,7 +1662,7 @@
           <a:p>
             <a:pPr lvl="0"/>
             <a:r>
-              <a:rPr lang="en-US"/>
+              <a:rPr lang="en-US" smtClean="0"/>
               <a:t>Click to edit Master text styles</a:t>
             </a:r>
           </a:p>
@@ -1720,37 +1718,38 @@
           <a:p>
             <a:pPr lvl="0"/>
             <a:r>
-              <a:rPr lang="en-US"/>
+              <a:rPr lang="en-US" smtClean="0"/>
               <a:t>Click to edit Master text styles</a:t>
             </a:r>
           </a:p>
           <a:p>
             <a:pPr lvl="1"/>
             <a:r>
-              <a:rPr lang="en-US"/>
+              <a:rPr lang="en-US" smtClean="0"/>
               <a:t>Second level</a:t>
             </a:r>
           </a:p>
           <a:p>
             <a:pPr lvl="2"/>
             <a:r>
-              <a:rPr lang="en-US"/>
+              <a:rPr lang="en-US" smtClean="0"/>
               <a:t>Third level</a:t>
             </a:r>
           </a:p>
           <a:p>
             <a:pPr lvl="3"/>
             <a:r>
-              <a:rPr lang="en-US"/>
+              <a:rPr lang="en-US" smtClean="0"/>
               <a:t>Fourth level</a:t>
             </a:r>
           </a:p>
           <a:p>
             <a:pPr lvl="4"/>
             <a:r>
-              <a:rPr lang="en-US"/>
+              <a:rPr lang="en-US" smtClean="0"/>
               <a:t>Fifth level</a:t>
             </a:r>
+            <a:endParaRPr lang="en-US"/>
           </a:p>
         </p:txBody>
       </p:sp>
@@ -1771,7 +1770,7 @@
           <a:p>
             <a:fld id="{5BCAD085-E8A6-8845-BD4E-CB4CCA059FC4}" type="datetimeFigureOut">
               <a:rPr lang="en-US" smtClean="0"/>
-              <a:t>10/25/2022</a:t>
+              <a:t>1/27/13</a:t>
             </a:fld>
             <a:endParaRPr lang="en-US"/>
           </a:p>
@@ -1865,9 +1864,10 @@
           <a:lstStyle/>
           <a:p>
             <a:r>
-              <a:rPr lang="en-US"/>
+              <a:rPr lang="en-US" smtClean="0"/>
               <a:t>Click to edit Master title style</a:t>
             </a:r>
+            <a:endParaRPr lang="en-US"/>
           </a:p>
         </p:txBody>
       </p:sp>
@@ -1888,7 +1888,7 @@
           <a:p>
             <a:fld id="{5BCAD085-E8A6-8845-BD4E-CB4CCA059FC4}" type="datetimeFigureOut">
               <a:rPr lang="en-US" smtClean="0"/>
-              <a:t>10/25/2022</a:t>
+              <a:t>1/27/13</a:t>
             </a:fld>
             <a:endParaRPr lang="en-US"/>
           </a:p>
@@ -1983,7 +1983,7 @@
           <a:p>
             <a:fld id="{5BCAD085-E8A6-8845-BD4E-CB4CCA059FC4}" type="datetimeFigureOut">
               <a:rPr lang="en-US" smtClean="0"/>
-              <a:t>10/25/2022</a:t>
+              <a:t>1/27/13</a:t>
             </a:fld>
             <a:endParaRPr lang="en-US"/>
           </a:p>
@@ -2086,9 +2086,10 @@
           </a:lstStyle>
           <a:p>
             <a:r>
-              <a:rPr lang="en-US"/>
+              <a:rPr lang="en-US" smtClean="0"/>
               <a:t>Click to edit Master title style</a:t>
             </a:r>
+            <a:endParaRPr lang="en-US"/>
           </a:p>
         </p:txBody>
       </p:sp>
@@ -2142,37 +2143,38 @@
           <a:p>
             <a:pPr lvl="0"/>
             <a:r>
-              <a:rPr lang="en-US"/>
+              <a:rPr lang="en-US" smtClean="0"/>
               <a:t>Click to edit Master text styles</a:t>
             </a:r>
           </a:p>
           <a:p>
             <a:pPr lvl="1"/>
             <a:r>
-              <a:rPr lang="en-US"/>
+              <a:rPr lang="en-US" smtClean="0"/>
               <a:t>Second level</a:t>
             </a:r>
           </a:p>
           <a:p>
             <a:pPr lvl="2"/>
             <a:r>
-              <a:rPr lang="en-US"/>
+              <a:rPr lang="en-US" smtClean="0"/>
               <a:t>Third level</a:t>
             </a:r>
           </a:p>
           <a:p>
             <a:pPr lvl="3"/>
             <a:r>
-              <a:rPr lang="en-US"/>
+              <a:rPr lang="en-US" smtClean="0"/>
               <a:t>Fourth level</a:t>
             </a:r>
           </a:p>
           <a:p>
             <a:pPr lvl="4"/>
             <a:r>
-              <a:rPr lang="en-US"/>
+              <a:rPr lang="en-US" smtClean="0"/>
               <a:t>Fifth level</a:t>
             </a:r>
+            <a:endParaRPr lang="en-US"/>
           </a:p>
         </p:txBody>
       </p:sp>
@@ -2235,7 +2237,7 @@
           <a:p>
             <a:pPr lvl="0"/>
             <a:r>
-              <a:rPr lang="en-US"/>
+              <a:rPr lang="en-US" smtClean="0"/>
               <a:t>Click to edit Master text styles</a:t>
             </a:r>
           </a:p>
@@ -2258,7 +2260,7 @@
           <a:p>
             <a:fld id="{5BCAD085-E8A6-8845-BD4E-CB4CCA059FC4}" type="datetimeFigureOut">
               <a:rPr lang="en-US" smtClean="0"/>
-              <a:t>10/25/2022</a:t>
+              <a:t>1/27/13</a:t>
             </a:fld>
             <a:endParaRPr lang="en-US"/>
           </a:p>
@@ -2361,9 +2363,10 @@
           </a:lstStyle>
           <a:p>
             <a:r>
-              <a:rPr lang="en-US"/>
+              <a:rPr lang="en-US" smtClean="0"/>
               <a:t>Click to edit Master title style</a:t>
             </a:r>
+            <a:endParaRPr lang="en-US"/>
           </a:p>
         </p:txBody>
       </p:sp>
@@ -2487,7 +2490,7 @@
           <a:p>
             <a:pPr lvl="0"/>
             <a:r>
-              <a:rPr lang="en-US"/>
+              <a:rPr lang="en-US" smtClean="0"/>
               <a:t>Click to edit Master text styles</a:t>
             </a:r>
           </a:p>
@@ -2510,7 +2513,7 @@
           <a:p>
             <a:fld id="{5BCAD085-E8A6-8845-BD4E-CB4CCA059FC4}" type="datetimeFigureOut">
               <a:rPr lang="en-US" smtClean="0"/>
-              <a:t>10/25/2022</a:t>
+              <a:t>1/27/13</a:t>
             </a:fld>
             <a:endParaRPr lang="en-US"/>
           </a:p>
@@ -2619,9 +2622,10 @@
           <a:lstStyle/>
           <a:p>
             <a:r>
-              <a:rPr lang="en-US"/>
+              <a:rPr lang="en-US" smtClean="0"/>
               <a:t>Click to edit Master title style</a:t>
             </a:r>
+            <a:endParaRPr lang="en-US"/>
           </a:p>
         </p:txBody>
       </p:sp>
@@ -2652,37 +2656,38 @@
           <a:p>
             <a:pPr lvl="0"/>
             <a:r>
-              <a:rPr lang="en-US"/>
+              <a:rPr lang="en-US" smtClean="0"/>
               <a:t>Click to edit Master text styles</a:t>
             </a:r>
           </a:p>
           <a:p>
             <a:pPr lvl="1"/>
             <a:r>
-              <a:rPr lang="en-US"/>
+              <a:rPr lang="en-US" smtClean="0"/>
               <a:t>Second level</a:t>
             </a:r>
           </a:p>
           <a:p>
             <a:pPr lvl="2"/>
             <a:r>
-              <a:rPr lang="en-US"/>
+              <a:rPr lang="en-US" smtClean="0"/>
               <a:t>Third level</a:t>
             </a:r>
           </a:p>
           <a:p>
             <a:pPr lvl="3"/>
             <a:r>
-              <a:rPr lang="en-US"/>
+              <a:rPr lang="en-US" smtClean="0"/>
               <a:t>Fourth level</a:t>
             </a:r>
           </a:p>
           <a:p>
             <a:pPr lvl="4"/>
             <a:r>
-              <a:rPr lang="en-US"/>
+              <a:rPr lang="en-US" smtClean="0"/>
               <a:t>Fifth level</a:t>
             </a:r>
+            <a:endParaRPr lang="en-US"/>
           </a:p>
         </p:txBody>
       </p:sp>
@@ -2721,7 +2726,7 @@
           <a:p>
             <a:fld id="{5BCAD085-E8A6-8845-BD4E-CB4CCA059FC4}" type="datetimeFigureOut">
               <a:rPr lang="en-US" smtClean="0"/>
-              <a:t>10/25/2022</a:t>
+              <a:t>1/27/13</a:t>
             </a:fld>
             <a:endParaRPr lang="en-US"/>
           </a:p>
@@ -3080,7 +3085,7 @@
 </file>
 
 <file path=ppt/slides/slide1.xml><?xml version="1.0" encoding="utf-8"?>
-<p:sld xmlns:a="http://schemas.openxmlformats.org/drawingml/2006/main" xmlns:r="http://schemas.openxmlformats.org/officeDocument/2006/relationships" xmlns:p="http://schemas.openxmlformats.org/presentationml/2006/main">
+<p:sld xmlns:a="http://schemas.openxmlformats.org/drawingml/2006/main" xmlns:p="http://schemas.openxmlformats.org/presentationml/2006/main" xmlns:r="http://schemas.openxmlformats.org/officeDocument/2006/relationships">
   <p:cSld>
     <p:bg>
       <p:bgPr>
@@ -3096,14 +3101,7 @@
         <p:cNvGrpSpPr/>
         <p:nvPr/>
       </p:nvGrpSpPr>
-      <p:grpSpPr>
-        <a:xfrm>
-          <a:off x="0" y="0"/>
-          <a:ext cx="0" cy="0"/>
-          <a:chOff x="0" y="0"/>
-          <a:chExt cx="0" cy="0"/>
-        </a:xfrm>
-      </p:grpSpPr>
+      <p:grpSpPr/>
       <p:sp>
         <p:nvSpPr>
           <p:cNvPr id="2" name="Title 1"/>
@@ -3127,7 +3125,7 @@
               </a:defRPr>
             </a:pPr>
             <a:r>
-              <a:t>IK Sirius - Villa Lidköping BK</a:t>
+              <a:t>Villa Lidköping BK - IK Sirius</a:t>
             </a:r>
           </a:p>
         </p:txBody>
@@ -3155,14 +3153,14 @@
               </a:defRPr>
             </a:pPr>
             <a:r>
-              <a:t>0 - 4</a:t>
+              <a:t>4 - 0</a:t>
             </a:r>
           </a:p>
         </p:txBody>
       </p:sp>
       <p:pic>
         <p:nvPicPr>
-          <p:cNvPr id="4" name="Picture 3" descr="sirius logo.png"/>
+          <p:cNvPr id="4" name="Picture 3" descr="villa logo.png"/>
           <p:cNvPicPr>
             <a:picLocks noChangeAspect="1"/>
           </p:cNvPicPr>
@@ -3186,7 +3184,7 @@
       </p:pic>
       <p:pic>
         <p:nvPicPr>
-          <p:cNvPr id="5" name="Picture 4" descr="villa logo.png"/>
+          <p:cNvPr id="5" name="Picture 4" descr="sirius logo.png"/>
           <p:cNvPicPr>
             <a:picLocks noChangeAspect="1"/>
           </p:cNvPicPr>
@@ -3217,7 +3215,7 @@
 </file>
 
 <file path=ppt/slides/slide2.xml><?xml version="1.0" encoding="utf-8"?>
-<p:sld xmlns:a="http://schemas.openxmlformats.org/drawingml/2006/main" xmlns:r="http://schemas.openxmlformats.org/officeDocument/2006/relationships" xmlns:p="http://schemas.openxmlformats.org/presentationml/2006/main">
+<p:sld xmlns:a="http://schemas.openxmlformats.org/drawingml/2006/main" xmlns:p="http://schemas.openxmlformats.org/presentationml/2006/main" xmlns:r="http://schemas.openxmlformats.org/officeDocument/2006/relationships">
   <p:cSld>
     <p:bg>
       <p:bgPr>
@@ -3233,14 +3231,7 @@
         <p:cNvGrpSpPr/>
         <p:nvPr/>
       </p:nvGrpSpPr>
-      <p:grpSpPr>
-        <a:xfrm>
-          <a:off x="0" y="0"/>
-          <a:ext cx="0" cy="0"/>
-          <a:chOff x="0" y="0"/>
-          <a:chExt cx="0" cy="0"/>
-        </a:xfrm>
-      </p:grpSpPr>
+      <p:grpSpPr/>
       <p:sp>
         <p:nvSpPr>
           <p:cNvPr id="2" name="Title 1"/>
@@ -3280,6 +3271,99 @@
             <a:pPr>
               <a:defRPr>
                 <a:solidFill>
+                  <a:srgbClr val="FFFEFE"/>
+                </a:solidFill>
+              </a:defRPr>
+            </a:pPr>
+            <a:r>
+              <a:t>Villa</a:t>
+            </a:r>
+          </a:p>
+        </p:txBody>
+      </p:sp>
+      <p:sp>
+        <p:nvSpPr>
+          <p:cNvPr id="4" name="Content Placeholder 3"/>
+          <p:cNvSpPr>
+            <a:spLocks noGrp="1"/>
+          </p:cNvSpPr>
+          <p:nvPr>
+            <p:ph idx="2" sz="half"/>
+          </p:nvPr>
+        </p:nvSpPr>
+        <p:spPr/>
+        <p:txBody>
+          <a:bodyPr/>
+          <a:lstStyle/>
+          <a:p/>
+          <a:p>
+            <a:pPr>
+              <a:defRPr>
+                <a:solidFill>
+                  <a:srgbClr val="FFFEFE"/>
+                </a:solidFill>
+              </a:defRPr>
+            </a:pPr>
+            <a:r>
+              <a:t>Resultat: </a:t>
+            </a:r>
+            <a:br/>
+            <a:r>
+              <a:t>	4</a:t>
+            </a:r>
+          </a:p>
+          <a:p>
+            <a:pPr>
+              <a:defRPr>
+                <a:solidFill>
+                  <a:srgbClr val="FFFEFE"/>
+                </a:solidFill>
+              </a:defRPr>
+            </a:pPr>
+            <a:r>
+              <a:t>Skott på mål: </a:t>
+            </a:r>
+            <a:br/>
+            <a:r>
+              <a:t>	7</a:t>
+            </a:r>
+          </a:p>
+          <a:p>
+            <a:pPr>
+              <a:defRPr>
+                <a:solidFill>
+                  <a:srgbClr val="FFFEFE"/>
+                </a:solidFill>
+              </a:defRPr>
+            </a:pPr>
+            <a:r>
+              <a:t>Bollinnehav: </a:t>
+            </a:r>
+            <a:br/>
+            <a:r>
+              <a:t>	0:11:21</a:t>
+            </a:r>
+          </a:p>
+        </p:txBody>
+      </p:sp>
+      <p:sp>
+        <p:nvSpPr>
+          <p:cNvPr id="5" name="Text Placeholder 4"/>
+          <p:cNvSpPr>
+            <a:spLocks noGrp="1"/>
+          </p:cNvSpPr>
+          <p:nvPr>
+            <p:ph type="body" idx="3" sz="quarter"/>
+          </p:nvPr>
+        </p:nvSpPr>
+        <p:spPr/>
+        <p:txBody>
+          <a:bodyPr/>
+          <a:lstStyle/>
+          <a:p>
+            <a:pPr>
+              <a:defRPr>
+                <a:solidFill>
                   <a:srgbClr val="000000"/>
                 </a:solidFill>
               </a:defRPr>
@@ -3292,21 +3376,19 @@
       </p:sp>
       <p:sp>
         <p:nvSpPr>
-          <p:cNvPr id="4" name="Content Placeholder 3"/>
-          <p:cNvSpPr>
-            <a:spLocks noGrp="1"/>
-          </p:cNvSpPr>
-          <p:nvPr>
-            <p:ph sz="half" idx="2"/>
-          </p:nvPr>
-        </p:nvSpPr>
-        <p:spPr/>
-        <p:txBody>
-          <a:bodyPr/>
-          <a:lstStyle/>
-          <a:p>
-            <a:endParaRPr/>
-          </a:p>
+          <p:cNvPr id="6" name="Content Placeholder 5"/>
+          <p:cNvSpPr>
+            <a:spLocks noGrp="1"/>
+          </p:cNvSpPr>
+          <p:nvPr>
+            <p:ph idx="4" sz="quarter"/>
+          </p:nvPr>
+        </p:nvSpPr>
+        <p:spPr/>
+        <p:txBody>
+          <a:bodyPr/>
+          <a:lstStyle/>
+          <a:p/>
           <a:p>
             <a:pPr>
               <a:defRPr>
@@ -3353,108 +3435,13 @@
             <a:br/>
             <a:r>
               <a:t>	0:12:31</a:t>
-            </a:r>
-          </a:p>
-        </p:txBody>
-      </p:sp>
-      <p:sp>
-        <p:nvSpPr>
-          <p:cNvPr id="5" name="Text Placeholder 4"/>
-          <p:cNvSpPr>
-            <a:spLocks noGrp="1"/>
-          </p:cNvSpPr>
-          <p:nvPr>
-            <p:ph type="body" sz="quarter" idx="3"/>
-          </p:nvPr>
-        </p:nvSpPr>
-        <p:spPr/>
-        <p:txBody>
-          <a:bodyPr/>
-          <a:lstStyle/>
-          <a:p>
-            <a:pPr>
-              <a:defRPr>
-                <a:solidFill>
-                  <a:srgbClr val="FFFEFE"/>
-                </a:solidFill>
-              </a:defRPr>
-            </a:pPr>
-            <a:r>
-              <a:t>Villa</a:t>
-            </a:r>
-          </a:p>
-        </p:txBody>
-      </p:sp>
-      <p:sp>
-        <p:nvSpPr>
-          <p:cNvPr id="6" name="Content Placeholder 5"/>
-          <p:cNvSpPr>
-            <a:spLocks noGrp="1"/>
-          </p:cNvSpPr>
-          <p:nvPr>
-            <p:ph sz="quarter" idx="4"/>
-          </p:nvPr>
-        </p:nvSpPr>
-        <p:spPr/>
-        <p:txBody>
-          <a:bodyPr/>
-          <a:lstStyle/>
-          <a:p>
-            <a:endParaRPr/>
-          </a:p>
-          <a:p>
-            <a:pPr>
-              <a:defRPr>
-                <a:solidFill>
-                  <a:srgbClr val="FFFEFE"/>
-                </a:solidFill>
-              </a:defRPr>
-            </a:pPr>
-            <a:r>
-              <a:t>Resultat: </a:t>
-            </a:r>
-            <a:br/>
-            <a:r>
-              <a:t>	4</a:t>
-            </a:r>
-          </a:p>
-          <a:p>
-            <a:pPr>
-              <a:defRPr>
-                <a:solidFill>
-                  <a:srgbClr val="FFFEFE"/>
-                </a:solidFill>
-              </a:defRPr>
-            </a:pPr>
-            <a:r>
-              <a:t>Skott på mål: </a:t>
-            </a:r>
-            <a:br/>
-            <a:r>
-              <a:t>	7</a:t>
-            </a:r>
-          </a:p>
-          <a:p>
-            <a:pPr>
-              <a:defRPr>
-                <a:solidFill>
-                  <a:srgbClr val="FFFEFE"/>
-                </a:solidFill>
-              </a:defRPr>
-            </a:pPr>
-            <a:r>
-              <a:t>Bollinnehav: </a:t>
-            </a:r>
-            <a:br/>
-            <a:r>
-              <a:t>	0:11:21</a:t>
             </a:r>
           </a:p>
         </p:txBody>
       </p:sp>
       <p:pic>
         <p:nvPicPr>
-          <p:cNvPr id="7" name="Picture 6" descr="sirius logo.png"/>
+          <p:cNvPr id="7" name="Picture 6" descr="villa logo.png"/>
           <p:cNvPicPr>
             <a:picLocks noChangeAspect="1"/>
           </p:cNvPicPr>
@@ -3478,7 +3465,7 @@
       </p:pic>
       <p:pic>
         <p:nvPicPr>
-          <p:cNvPr id="8" name="Picture 7" descr="villa logo.png"/>
+          <p:cNvPr id="8" name="Picture 7" descr="sirius logo.png"/>
           <p:cNvPicPr>
             <a:picLocks noChangeAspect="1"/>
           </p:cNvPicPr>
@@ -3509,7 +3496,7 @@
 </file>
 
 <file path=ppt/slides/slide3.xml><?xml version="1.0" encoding="utf-8"?>
-<p:sld xmlns:a="http://schemas.openxmlformats.org/drawingml/2006/main" xmlns:r="http://schemas.openxmlformats.org/officeDocument/2006/relationships" xmlns:p="http://schemas.openxmlformats.org/presentationml/2006/main">
+<p:sld xmlns:a="http://schemas.openxmlformats.org/drawingml/2006/main" xmlns:p="http://schemas.openxmlformats.org/presentationml/2006/main" xmlns:r="http://schemas.openxmlformats.org/officeDocument/2006/relationships">
   <p:cSld>
     <p:bg>
       <p:bgPr>
@@ -3525,14 +3512,7 @@
         <p:cNvGrpSpPr/>
         <p:nvPr/>
       </p:nvGrpSpPr>
-      <p:grpSpPr>
-        <a:xfrm>
-          <a:off x="0" y="0"/>
-          <a:ext cx="0" cy="0"/>
-          <a:chOff x="0" y="0"/>
-          <a:chExt cx="0" cy="0"/>
-        </a:xfrm>
-      </p:grpSpPr>
+      <p:grpSpPr/>
       <p:sp>
         <p:nvSpPr>
           <p:cNvPr id="2" name="Title 1"/>
@@ -3572,6 +3552,99 @@
             <a:pPr>
               <a:defRPr>
                 <a:solidFill>
+                  <a:srgbClr val="FFFEFE"/>
+                </a:solidFill>
+              </a:defRPr>
+            </a:pPr>
+            <a:r>
+              <a:t>Villa</a:t>
+            </a:r>
+          </a:p>
+        </p:txBody>
+      </p:sp>
+      <p:sp>
+        <p:nvSpPr>
+          <p:cNvPr id="4" name="Content Placeholder 3"/>
+          <p:cNvSpPr>
+            <a:spLocks noGrp="1"/>
+          </p:cNvSpPr>
+          <p:nvPr>
+            <p:ph idx="2" sz="half"/>
+          </p:nvPr>
+        </p:nvSpPr>
+        <p:spPr/>
+        <p:txBody>
+          <a:bodyPr/>
+          <a:lstStyle/>
+          <a:p/>
+          <a:p>
+            <a:pPr>
+              <a:defRPr>
+                <a:solidFill>
+                  <a:srgbClr val="FFFEFE"/>
+                </a:solidFill>
+              </a:defRPr>
+            </a:pPr>
+            <a:r>
+              <a:t>Vunna närkamper: </a:t>
+            </a:r>
+            <a:br/>
+            <a:r>
+              <a:t>	5</a:t>
+            </a:r>
+          </a:p>
+          <a:p>
+            <a:pPr>
+              <a:defRPr>
+                <a:solidFill>
+                  <a:srgbClr val="FFFEFE"/>
+                </a:solidFill>
+              </a:defRPr>
+            </a:pPr>
+            <a:r>
+              <a:t>Brytningar: </a:t>
+            </a:r>
+            <a:br/>
+            <a:r>
+              <a:t>	1</a:t>
+            </a:r>
+          </a:p>
+          <a:p>
+            <a:pPr>
+              <a:defRPr>
+                <a:solidFill>
+                  <a:srgbClr val="FFFEFE"/>
+                </a:solidFill>
+              </a:defRPr>
+            </a:pPr>
+            <a:r>
+              <a:t>Bolltapp: </a:t>
+            </a:r>
+            <a:br/>
+            <a:r>
+              <a:t>	0</a:t>
+            </a:r>
+          </a:p>
+        </p:txBody>
+      </p:sp>
+      <p:sp>
+        <p:nvSpPr>
+          <p:cNvPr id="5" name="Text Placeholder 4"/>
+          <p:cNvSpPr>
+            <a:spLocks noGrp="1"/>
+          </p:cNvSpPr>
+          <p:nvPr>
+            <p:ph type="body" idx="3" sz="quarter"/>
+          </p:nvPr>
+        </p:nvSpPr>
+        <p:spPr/>
+        <p:txBody>
+          <a:bodyPr/>
+          <a:lstStyle/>
+          <a:p>
+            <a:pPr>
+              <a:defRPr>
+                <a:solidFill>
                   <a:srgbClr val="000000"/>
                 </a:solidFill>
               </a:defRPr>
@@ -3584,21 +3657,19 @@
       </p:sp>
       <p:sp>
         <p:nvSpPr>
-          <p:cNvPr id="4" name="Content Placeholder 3"/>
-          <p:cNvSpPr>
-            <a:spLocks noGrp="1"/>
-          </p:cNvSpPr>
-          <p:nvPr>
-            <p:ph sz="half" idx="2"/>
-          </p:nvPr>
-        </p:nvSpPr>
-        <p:spPr/>
-        <p:txBody>
-          <a:bodyPr/>
-          <a:lstStyle/>
-          <a:p>
-            <a:endParaRPr/>
-          </a:p>
+          <p:cNvPr id="6" name="Content Placeholder 5"/>
+          <p:cNvSpPr>
+            <a:spLocks noGrp="1"/>
+          </p:cNvSpPr>
+          <p:nvPr>
+            <p:ph idx="4" sz="quarter"/>
+          </p:nvPr>
+        </p:nvSpPr>
+        <p:spPr/>
+        <p:txBody>
+          <a:bodyPr/>
+          <a:lstStyle/>
+          <a:p/>
           <a:p>
             <a:pPr>
               <a:defRPr>
@@ -3645,108 +3716,13 @@
             <a:br/>
             <a:r>
               <a:t>	8</a:t>
-            </a:r>
-          </a:p>
-        </p:txBody>
-      </p:sp>
-      <p:sp>
-        <p:nvSpPr>
-          <p:cNvPr id="5" name="Text Placeholder 4"/>
-          <p:cNvSpPr>
-            <a:spLocks noGrp="1"/>
-          </p:cNvSpPr>
-          <p:nvPr>
-            <p:ph type="body" sz="quarter" idx="3"/>
-          </p:nvPr>
-        </p:nvSpPr>
-        <p:spPr/>
-        <p:txBody>
-          <a:bodyPr/>
-          <a:lstStyle/>
-          <a:p>
-            <a:pPr>
-              <a:defRPr>
-                <a:solidFill>
-                  <a:srgbClr val="FFFEFE"/>
-                </a:solidFill>
-              </a:defRPr>
-            </a:pPr>
-            <a:r>
-              <a:t>Villa</a:t>
-            </a:r>
-          </a:p>
-        </p:txBody>
-      </p:sp>
-      <p:sp>
-        <p:nvSpPr>
-          <p:cNvPr id="6" name="Content Placeholder 5"/>
-          <p:cNvSpPr>
-            <a:spLocks noGrp="1"/>
-          </p:cNvSpPr>
-          <p:nvPr>
-            <p:ph sz="quarter" idx="4"/>
-          </p:nvPr>
-        </p:nvSpPr>
-        <p:spPr/>
-        <p:txBody>
-          <a:bodyPr/>
-          <a:lstStyle/>
-          <a:p>
-            <a:endParaRPr/>
-          </a:p>
-          <a:p>
-            <a:pPr>
-              <a:defRPr>
-                <a:solidFill>
-                  <a:srgbClr val="FFFEFE"/>
-                </a:solidFill>
-              </a:defRPr>
-            </a:pPr>
-            <a:r>
-              <a:t>Vunna närkamper: </a:t>
-            </a:r>
-            <a:br/>
-            <a:r>
-              <a:t>	5</a:t>
-            </a:r>
-          </a:p>
-          <a:p>
-            <a:pPr>
-              <a:defRPr>
-                <a:solidFill>
-                  <a:srgbClr val="FFFEFE"/>
-                </a:solidFill>
-              </a:defRPr>
-            </a:pPr>
-            <a:r>
-              <a:t>Brytningar: </a:t>
-            </a:r>
-            <a:br/>
-            <a:r>
-              <a:t>	1</a:t>
-            </a:r>
-          </a:p>
-          <a:p>
-            <a:pPr>
-              <a:defRPr>
-                <a:solidFill>
-                  <a:srgbClr val="FFFEFE"/>
-                </a:solidFill>
-              </a:defRPr>
-            </a:pPr>
-            <a:r>
-              <a:t>Bolltapp: </a:t>
-            </a:r>
-            <a:br/>
-            <a:r>
-              <a:t>	0</a:t>
             </a:r>
           </a:p>
         </p:txBody>
       </p:sp>
       <p:pic>
         <p:nvPicPr>
-          <p:cNvPr id="7" name="Picture 6" descr="sirius logo.png"/>
+          <p:cNvPr id="7" name="Picture 6" descr="villa logo.png"/>
           <p:cNvPicPr>
             <a:picLocks noChangeAspect="1"/>
           </p:cNvPicPr>
@@ -3770,7 +3746,7 @@
       </p:pic>
       <p:pic>
         <p:nvPicPr>
-          <p:cNvPr id="8" name="Picture 7" descr="villa logo.png"/>
+          <p:cNvPr id="8" name="Picture 7" descr="sirius logo.png"/>
           <p:cNvPicPr>
             <a:picLocks noChangeAspect="1"/>
           </p:cNvPicPr>
@@ -3801,7 +3777,7 @@
 </file>
 
 <file path=ppt/slides/slide4.xml><?xml version="1.0" encoding="utf-8"?>
-<p:sld xmlns:a="http://schemas.openxmlformats.org/drawingml/2006/main" xmlns:r="http://schemas.openxmlformats.org/officeDocument/2006/relationships" xmlns:p="http://schemas.openxmlformats.org/presentationml/2006/main">
+<p:sld xmlns:a="http://schemas.openxmlformats.org/drawingml/2006/main" xmlns:p="http://schemas.openxmlformats.org/presentationml/2006/main" xmlns:r="http://schemas.openxmlformats.org/officeDocument/2006/relationships">
   <p:cSld>
     <p:bg>
       <p:bgPr>
@@ -3817,14 +3793,7 @@
         <p:cNvGrpSpPr/>
         <p:nvPr/>
       </p:nvGrpSpPr>
-      <p:grpSpPr>
-        <a:xfrm>
-          <a:off x="0" y="0"/>
-          <a:ext cx="0" cy="0"/>
-          <a:chOff x="0" y="0"/>
-          <a:chExt cx="0" cy="0"/>
-        </a:xfrm>
-      </p:grpSpPr>
+      <p:grpSpPr/>
       <p:sp>
         <p:nvSpPr>
           <p:cNvPr id="2" name="Title 1"/>
@@ -3853,7 +3822,7 @@
       </p:sp>
       <p:pic>
         <p:nvPicPr>
-          <p:cNvPr id="3" name="Picture 2" descr="sirius logo.png"/>
+          <p:cNvPr id="3" name="Picture 2" descr="villa logo.png"/>
           <p:cNvPicPr>
             <a:picLocks noChangeAspect="1"/>
           </p:cNvPicPr>
@@ -3877,7 +3846,7 @@
       </p:pic>
       <p:pic>
         <p:nvPicPr>
-          <p:cNvPr id="4" name="Picture 3" descr="villa logo.png"/>
+          <p:cNvPr id="4" name="Picture 3" descr="sirius logo.png"/>
           <p:cNvPicPr>
             <a:picLocks noChangeAspect="1"/>
           </p:cNvPicPr>
@@ -3918,27 +3887,9 @@
                 <a:tableStyleId>{69CF1AB2-1976-4502-BF36-3FF5EA218861}</a:tableStyleId>
               </a:tblPr>
               <a:tblGrid>
-                <a:gridCol w="1828800">
-                  <a:extLst>
-                    <a:ext uri="{9D8B030D-6E8A-4147-A177-3AD203B41FA5}">
-                      <a16:colId xmlns:a16="http://schemas.microsoft.com/office/drawing/2014/main" val="20000"/>
-                    </a:ext>
-                  </a:extLst>
-                </a:gridCol>
-                <a:gridCol w="1828800">
-                  <a:extLst>
-                    <a:ext uri="{9D8B030D-6E8A-4147-A177-3AD203B41FA5}">
-                      <a16:colId xmlns:a16="http://schemas.microsoft.com/office/drawing/2014/main" val="20001"/>
-                    </a:ext>
-                  </a:extLst>
-                </a:gridCol>
-                <a:gridCol w="1828800">
-                  <a:extLst>
-                    <a:ext uri="{9D8B030D-6E8A-4147-A177-3AD203B41FA5}">
-                      <a16:colId xmlns:a16="http://schemas.microsoft.com/office/drawing/2014/main" val="20002"/>
-                    </a:ext>
-                  </a:extLst>
-                </a:gridCol>
+                <a:gridCol w="1828800"/>
+                <a:gridCol w="1828800"/>
+                <a:gridCol w="1828800"/>
               </a:tblGrid>
               <a:tr h="1219200">
                 <a:tc>
@@ -3949,7 +3900,6 @@
                       <a:pPr algn="ctr">
                         <a:defRPr sz="2500" b="1"/>
                       </a:pPr>
-                      <a:endParaRPr/>
                     </a:p>
                   </a:txBody>
                   <a:tcPr anchor="ctr">
@@ -3967,12 +3917,7 @@
                         <a:defRPr sz="2500" b="1"/>
                       </a:pPr>
                       <a:r>
-                        <a:rPr dirty="0" err="1"/>
-                        <a:t>Efter</a:t>
-                      </a:r>
-                      <a:r>
-                        <a:rPr dirty="0"/>
-                        <a:t> Sirius</a:t>
+                        <a:t>Efter Villa</a:t>
                       </a:r>
                     </a:p>
                   </a:txBody>
@@ -3987,84 +3932,12 @@
                         <a:defRPr sz="2500" b="1"/>
                       </a:pPr>
                       <a:r>
-                        <a:rPr dirty="0" err="1"/>
-                        <a:t>Efter</a:t>
-                      </a:r>
-                      <a:r>
-                        <a:rPr dirty="0"/>
-                        <a:t> Villa</a:t>
+                        <a:t>Efter Sirius</a:t>
                       </a:r>
                     </a:p>
                   </a:txBody>
                   <a:tcPr anchor="ctr"/>
                 </a:tc>
-                <a:extLst>
-                  <a:ext uri="{0D108BD9-81ED-4DB2-BD59-A6C34878D82A}">
-                    <a16:rowId xmlns:a16="http://schemas.microsoft.com/office/drawing/2014/main" val="10000"/>
-                  </a:ext>
-                </a:extLst>
-              </a:tr>
-              <a:tr h="1219200">
-                <a:tc>
-                  <a:txBody>
-                    <a:bodyPr/>
-                    <a:lstStyle/>
-                    <a:p>
-                      <a:pPr algn="ctr">
-                        <a:defRPr sz="2500" b="1"/>
-                      </a:pPr>
-                      <a:r>
-                        <a:rPr dirty="0" err="1"/>
-                        <a:t>Före</a:t>
-                      </a:r>
-                      <a:r>
-                        <a:rPr dirty="0"/>
-                        <a:t> Sirius</a:t>
-                      </a:r>
-                    </a:p>
-                  </a:txBody>
-                  <a:tcPr anchor="ctr"/>
-                </a:tc>
-                <a:tc>
-                  <a:txBody>
-                    <a:bodyPr/>
-                    <a:lstStyle/>
-                    <a:p>
-                      <a:pPr algn="ctr">
-                        <a:defRPr sz="2500" b="1"/>
-                      </a:pPr>
-                      <a:r>
-                        <a:t>1</a:t>
-                      </a:r>
-                    </a:p>
-                  </a:txBody>
-                  <a:tcPr anchor="ctr">
-                    <a:solidFill>
-                      <a:srgbClr val="009ADE"/>
-                    </a:solidFill>
-                  </a:tcPr>
-                </a:tc>
-                <a:tc>
-                  <a:txBody>
-                    <a:bodyPr/>
-                    <a:lstStyle/>
-                    <a:p>
-                      <a:pPr algn="ctr">
-                        <a:defRPr sz="2500" b="1"/>
-                      </a:pPr>
-                      <a:r>
-                        <a:rPr dirty="0"/>
-                        <a:t>6</a:t>
-                      </a:r>
-                    </a:p>
-                  </a:txBody>
-                  <a:tcPr anchor="ctr"/>
-                </a:tc>
-                <a:extLst>
-                  <a:ext uri="{0D108BD9-81ED-4DB2-BD59-A6C34878D82A}">
-                    <a16:rowId xmlns:a16="http://schemas.microsoft.com/office/drawing/2014/main" val="10001"/>
-                  </a:ext>
-                </a:extLst>
               </a:tr>
               <a:tr h="1219200">
                 <a:tc>
@@ -4091,8 +3964,43 @@
                         <a:defRPr sz="2500" b="1"/>
                       </a:pPr>
                       <a:r>
-                        <a:rPr dirty="0"/>
+                        <a:t>0</a:t>
+                      </a:r>
+                    </a:p>
+                  </a:txBody>
+                  <a:tcPr anchor="ctr">
+                    <a:solidFill>
+                      <a:srgbClr val="009ADE"/>
+                    </a:solidFill>
+                  </a:tcPr>
+                </a:tc>
+                <a:tc>
+                  <a:txBody>
+                    <a:bodyPr/>
+                    <a:lstStyle/>
+                    <a:p>
+                      <a:pPr algn="ctr">
+                        <a:defRPr sz="2500" b="1"/>
+                      </a:pPr>
+                      <a:r>
                         <a:t>5</a:t>
+                      </a:r>
+                    </a:p>
+                  </a:txBody>
+                  <a:tcPr anchor="ctr"/>
+                </a:tc>
+              </a:tr>
+              <a:tr h="1219200">
+                <a:tc>
+                  <a:txBody>
+                    <a:bodyPr/>
+                    <a:lstStyle/>
+                    <a:p>
+                      <a:pPr algn="ctr">
+                        <a:defRPr sz="2500" b="1"/>
+                      </a:pPr>
+                      <a:r>
+                        <a:t>Före Sirius</a:t>
                       </a:r>
                     </a:p>
                   </a:txBody>
@@ -4107,8 +4015,22 @@
                         <a:defRPr sz="2500" b="1"/>
                       </a:pPr>
                       <a:r>
-                        <a:rPr dirty="0"/>
-                        <a:t>0</a:t>
+                        <a:t>6</a:t>
+                      </a:r>
+                    </a:p>
+                  </a:txBody>
+                  <a:tcPr anchor="ctr"/>
+                </a:tc>
+                <a:tc>
+                  <a:txBody>
+                    <a:bodyPr/>
+                    <a:lstStyle/>
+                    <a:p>
+                      <a:pPr algn="ctr">
+                        <a:defRPr sz="2500" b="1"/>
+                      </a:pPr>
+                      <a:r>
+                        <a:t>1</a:t>
                       </a:r>
                     </a:p>
                   </a:txBody>
@@ -4118,11 +4040,6 @@
                     </a:solidFill>
                   </a:tcPr>
                 </a:tc>
-                <a:extLst>
-                  <a:ext uri="{0D108BD9-81ED-4DB2-BD59-A6C34878D82A}">
-                    <a16:rowId xmlns:a16="http://schemas.microsoft.com/office/drawing/2014/main" val="10002"/>
-                  </a:ext>
-                </a:extLst>
               </a:tr>
             </a:tbl>
           </a:graphicData>
@@ -4137,7 +4054,7 @@
 </file>
 
 <file path=ppt/slides/slide5.xml><?xml version="1.0" encoding="utf-8"?>
-<p:sld xmlns:a="http://schemas.openxmlformats.org/drawingml/2006/main" xmlns:r="http://schemas.openxmlformats.org/officeDocument/2006/relationships" xmlns:p="http://schemas.openxmlformats.org/presentationml/2006/main">
+<p:sld xmlns:a="http://schemas.openxmlformats.org/drawingml/2006/main" xmlns:p="http://schemas.openxmlformats.org/presentationml/2006/main" xmlns:r="http://schemas.openxmlformats.org/officeDocument/2006/relationships">
   <p:cSld>
     <p:bg>
       <p:bgPr>
@@ -4153,14 +4070,7 @@
         <p:cNvGrpSpPr/>
         <p:nvPr/>
       </p:nvGrpSpPr>
-      <p:grpSpPr>
-        <a:xfrm>
-          <a:off x="0" y="0"/>
-          <a:ext cx="0" cy="0"/>
-          <a:chOff x="0" y="0"/>
-          <a:chExt cx="0" cy="0"/>
-        </a:xfrm>
-      </p:grpSpPr>
+      <p:grpSpPr/>
       <p:sp>
         <p:nvSpPr>
           <p:cNvPr id="2" name="Title 1"/>
@@ -4205,6 +4115,99 @@
             <a:pPr>
               <a:defRPr>
                 <a:solidFill>
+                  <a:srgbClr val="FFFEFE"/>
+                </a:solidFill>
+              </a:defRPr>
+            </a:pPr>
+            <a:r>
+              <a:t>Villa - skottförsök: 6</a:t>
+            </a:r>
+          </a:p>
+        </p:txBody>
+      </p:sp>
+      <p:sp>
+        <p:nvSpPr>
+          <p:cNvPr id="4" name="Content Placeholder 3"/>
+          <p:cNvSpPr>
+            <a:spLocks noGrp="1"/>
+          </p:cNvSpPr>
+          <p:nvPr>
+            <p:ph idx="2" sz="half"/>
+          </p:nvPr>
+        </p:nvSpPr>
+        <p:spPr/>
+        <p:txBody>
+          <a:bodyPr/>
+          <a:lstStyle/>
+          <a:p/>
+          <a:p>
+            <a:pPr>
+              <a:defRPr>
+                <a:solidFill>
+                  <a:srgbClr val="FFFEFE"/>
+                </a:solidFill>
+              </a:defRPr>
+            </a:pPr>
+            <a:r>
+              <a:t>Centralt: 3</a:t>
+            </a:r>
+          </a:p>
+          <a:p>
+            <a:pPr>
+              <a:defRPr>
+                <a:solidFill>
+                  <a:srgbClr val="FFFEFE"/>
+                </a:solidFill>
+              </a:defRPr>
+            </a:pPr>
+            <a:r>
+              <a:t>Dribbling: 1</a:t>
+            </a:r>
+          </a:p>
+          <a:p>
+            <a:pPr>
+              <a:defRPr>
+                <a:solidFill>
+                  <a:srgbClr val="FFFEFE"/>
+                </a:solidFill>
+              </a:defRPr>
+            </a:pPr>
+            <a:r>
+              <a:t>Inlägg: 2</a:t>
+            </a:r>
+          </a:p>
+          <a:p>
+            <a:pPr>
+              <a:defRPr>
+                <a:solidFill>
+                  <a:srgbClr val="FFFEFE"/>
+                </a:solidFill>
+              </a:defRPr>
+            </a:pPr>
+            <a:r>
+              <a:t>Utifrån: 0</a:t>
+            </a:r>
+          </a:p>
+        </p:txBody>
+      </p:sp>
+      <p:sp>
+        <p:nvSpPr>
+          <p:cNvPr id="5" name="Text Placeholder 4"/>
+          <p:cNvSpPr>
+            <a:spLocks noGrp="1"/>
+          </p:cNvSpPr>
+          <p:nvPr>
+            <p:ph type="body" idx="3" sz="quarter"/>
+          </p:nvPr>
+        </p:nvSpPr>
+        <p:spPr/>
+        <p:txBody>
+          <a:bodyPr/>
+          <a:lstStyle/>
+          <a:p>
+            <a:pPr>
+              <a:defRPr>
+                <a:solidFill>
                   <a:srgbClr val="000000"/>
                 </a:solidFill>
               </a:defRPr>
@@ -4217,21 +4220,19 @@
       </p:sp>
       <p:sp>
         <p:nvSpPr>
-          <p:cNvPr id="4" name="Content Placeholder 3"/>
-          <p:cNvSpPr>
-            <a:spLocks noGrp="1"/>
-          </p:cNvSpPr>
-          <p:nvPr>
-            <p:ph sz="half" idx="2"/>
-          </p:nvPr>
-        </p:nvSpPr>
-        <p:spPr/>
-        <p:txBody>
-          <a:bodyPr/>
-          <a:lstStyle/>
-          <a:p>
-            <a:endParaRPr/>
-          </a:p>
+          <p:cNvPr id="6" name="Content Placeholder 5"/>
+          <p:cNvSpPr>
+            <a:spLocks noGrp="1"/>
+          </p:cNvSpPr>
+          <p:nvPr>
+            <p:ph idx="4" sz="quarter"/>
+          </p:nvPr>
+        </p:nvSpPr>
+        <p:spPr/>
+        <p:txBody>
+          <a:bodyPr/>
+          <a:lstStyle/>
+          <a:p/>
           <a:p>
             <a:pPr>
               <a:defRPr>
@@ -4278,108 +4279,13 @@
             </a:pPr>
             <a:r>
               <a:t>Utifrån: 2</a:t>
-            </a:r>
-          </a:p>
-        </p:txBody>
-      </p:sp>
-      <p:sp>
-        <p:nvSpPr>
-          <p:cNvPr id="5" name="Text Placeholder 4"/>
-          <p:cNvSpPr>
-            <a:spLocks noGrp="1"/>
-          </p:cNvSpPr>
-          <p:nvPr>
-            <p:ph type="body" sz="quarter" idx="3"/>
-          </p:nvPr>
-        </p:nvSpPr>
-        <p:spPr/>
-        <p:txBody>
-          <a:bodyPr/>
-          <a:lstStyle/>
-          <a:p>
-            <a:pPr>
-              <a:defRPr>
-                <a:solidFill>
-                  <a:srgbClr val="FFFEFE"/>
-                </a:solidFill>
-              </a:defRPr>
-            </a:pPr>
-            <a:r>
-              <a:t>Villa - skottförsök: 6</a:t>
-            </a:r>
-          </a:p>
-        </p:txBody>
-      </p:sp>
-      <p:sp>
-        <p:nvSpPr>
-          <p:cNvPr id="6" name="Content Placeholder 5"/>
-          <p:cNvSpPr>
-            <a:spLocks noGrp="1"/>
-          </p:cNvSpPr>
-          <p:nvPr>
-            <p:ph sz="quarter" idx="4"/>
-          </p:nvPr>
-        </p:nvSpPr>
-        <p:spPr/>
-        <p:txBody>
-          <a:bodyPr/>
-          <a:lstStyle/>
-          <a:p>
-            <a:endParaRPr/>
-          </a:p>
-          <a:p>
-            <a:pPr>
-              <a:defRPr>
-                <a:solidFill>
-                  <a:srgbClr val="FFFEFE"/>
-                </a:solidFill>
-              </a:defRPr>
-            </a:pPr>
-            <a:r>
-              <a:t>Centralt: 3</a:t>
-            </a:r>
-          </a:p>
-          <a:p>
-            <a:pPr>
-              <a:defRPr>
-                <a:solidFill>
-                  <a:srgbClr val="FFFEFE"/>
-                </a:solidFill>
-              </a:defRPr>
-            </a:pPr>
-            <a:r>
-              <a:t>Dribbling: 1</a:t>
-            </a:r>
-          </a:p>
-          <a:p>
-            <a:pPr>
-              <a:defRPr>
-                <a:solidFill>
-                  <a:srgbClr val="FFFEFE"/>
-                </a:solidFill>
-              </a:defRPr>
-            </a:pPr>
-            <a:r>
-              <a:t>Inlägg: 2</a:t>
-            </a:r>
-          </a:p>
-          <a:p>
-            <a:pPr>
-              <a:defRPr>
-                <a:solidFill>
-                  <a:srgbClr val="FFFEFE"/>
-                </a:solidFill>
-              </a:defRPr>
-            </a:pPr>
-            <a:r>
-              <a:t>Utifrån: 0</a:t>
             </a:r>
           </a:p>
         </p:txBody>
       </p:sp>
       <p:pic>
         <p:nvPicPr>
-          <p:cNvPr id="7" name="Picture 6" descr="sirius logo.png"/>
+          <p:cNvPr id="7" name="Picture 6" descr="villa logo.png"/>
           <p:cNvPicPr>
             <a:picLocks noChangeAspect="1"/>
           </p:cNvPicPr>
@@ -4403,7 +4309,7 @@
       </p:pic>
       <p:pic>
         <p:nvPicPr>
-          <p:cNvPr id="8" name="Picture 7" descr="villa logo.png"/>
+          <p:cNvPr id="8" name="Picture 7" descr="sirius logo.png"/>
           <p:cNvPicPr>
             <a:picLocks noChangeAspect="1"/>
           </p:cNvPicPr>
@@ -4434,7 +4340,7 @@
 </file>
 
 <file path=ppt/slides/slide6.xml><?xml version="1.0" encoding="utf-8"?>
-<p:sld xmlns:a="http://schemas.openxmlformats.org/drawingml/2006/main" xmlns:r="http://schemas.openxmlformats.org/officeDocument/2006/relationships" xmlns:p="http://schemas.openxmlformats.org/presentationml/2006/main">
+<p:sld xmlns:a="http://schemas.openxmlformats.org/drawingml/2006/main" xmlns:p="http://schemas.openxmlformats.org/presentationml/2006/main" xmlns:r="http://schemas.openxmlformats.org/officeDocument/2006/relationships">
   <p:cSld>
     <p:bg>
       <p:bgPr>
@@ -4450,14 +4356,7 @@
         <p:cNvGrpSpPr/>
         <p:nvPr/>
       </p:nvGrpSpPr>
-      <p:grpSpPr>
-        <a:xfrm>
-          <a:off x="0" y="0"/>
-          <a:ext cx="0" cy="0"/>
-          <a:chOff x="0" y="0"/>
-          <a:chExt cx="0" cy="0"/>
-        </a:xfrm>
-      </p:grpSpPr>
+      <p:grpSpPr/>
       <p:sp>
         <p:nvSpPr>
           <p:cNvPr id="2" name="Title 1"/>
@@ -4502,6 +4401,135 @@
             <a:pPr>
               <a:defRPr>
                 <a:solidFill>
+                  <a:srgbClr val="FFFEFE"/>
+                </a:solidFill>
+              </a:defRPr>
+            </a:pPr>
+            <a:r>
+              <a:t>Villa - skottförsök: 11</a:t>
+            </a:r>
+          </a:p>
+        </p:txBody>
+      </p:sp>
+      <p:sp>
+        <p:nvSpPr>
+          <p:cNvPr id="4" name="Content Placeholder 3"/>
+          <p:cNvSpPr>
+            <a:spLocks noGrp="1"/>
+          </p:cNvSpPr>
+          <p:nvPr>
+            <p:ph idx="2" sz="half"/>
+          </p:nvPr>
+        </p:nvSpPr>
+        <p:spPr/>
+        <p:txBody>
+          <a:bodyPr/>
+          <a:lstStyle/>
+          <a:p/>
+          <a:p>
+            <a:pPr>
+              <a:defRPr>
+                <a:solidFill>
+                  <a:srgbClr val="FFFEFE"/>
+                </a:solidFill>
+              </a:defRPr>
+            </a:pPr>
+            <a:r>
+              <a:t>Boll: 0</a:t>
+            </a:r>
+          </a:p>
+          <a:p>
+            <a:pPr>
+              <a:defRPr>
+                <a:solidFill>
+                  <a:srgbClr val="FFFEFE"/>
+                </a:solidFill>
+              </a:defRPr>
+            </a:pPr>
+            <a:r>
+              <a:t>Bolltapp: 2</a:t>
+            </a:r>
+          </a:p>
+          <a:p>
+            <a:pPr>
+              <a:defRPr>
+                <a:solidFill>
+                  <a:srgbClr val="FFFEFE"/>
+                </a:solidFill>
+              </a:defRPr>
+            </a:pPr>
+            <a:r>
+              <a:t>Frislag: 0</a:t>
+            </a:r>
+          </a:p>
+          <a:p>
+            <a:pPr>
+              <a:defRPr>
+                <a:solidFill>
+                  <a:srgbClr val="FFFEFE"/>
+                </a:solidFill>
+              </a:defRPr>
+            </a:pPr>
+            <a:r>
+              <a:t>Hörna: 6</a:t>
+            </a:r>
+          </a:p>
+          <a:p>
+            <a:pPr>
+              <a:defRPr>
+                <a:solidFill>
+                  <a:srgbClr val="FFFEFE"/>
+                </a:solidFill>
+              </a:defRPr>
+            </a:pPr>
+            <a:r>
+              <a:t>Inslag: 1</a:t>
+            </a:r>
+          </a:p>
+          <a:p>
+            <a:pPr>
+              <a:defRPr>
+                <a:solidFill>
+                  <a:srgbClr val="FFFEFE"/>
+                </a:solidFill>
+              </a:defRPr>
+            </a:pPr>
+            <a:r>
+              <a:t>Offside: 0</a:t>
+            </a:r>
+          </a:p>
+          <a:p>
+            <a:pPr>
+              <a:defRPr>
+                <a:solidFill>
+                  <a:srgbClr val="FFFEFE"/>
+                </a:solidFill>
+              </a:defRPr>
+            </a:pPr>
+            <a:r>
+              <a:t>Utkast: 2</a:t>
+            </a:r>
+          </a:p>
+        </p:txBody>
+      </p:sp>
+      <p:sp>
+        <p:nvSpPr>
+          <p:cNvPr id="5" name="Text Placeholder 4"/>
+          <p:cNvSpPr>
+            <a:spLocks noGrp="1"/>
+          </p:cNvSpPr>
+          <p:nvPr>
+            <p:ph type="body" idx="3" sz="quarter"/>
+          </p:nvPr>
+        </p:nvSpPr>
+        <p:spPr/>
+        <p:txBody>
+          <a:bodyPr/>
+          <a:lstStyle/>
+          <a:p>
+            <a:pPr>
+              <a:defRPr>
+                <a:solidFill>
                   <a:srgbClr val="000000"/>
                 </a:solidFill>
               </a:defRPr>
@@ -4514,21 +4542,19 @@
       </p:sp>
       <p:sp>
         <p:nvSpPr>
-          <p:cNvPr id="4" name="Content Placeholder 3"/>
-          <p:cNvSpPr>
-            <a:spLocks noGrp="1"/>
-          </p:cNvSpPr>
-          <p:nvPr>
-            <p:ph sz="half" idx="2"/>
-          </p:nvPr>
-        </p:nvSpPr>
-        <p:spPr/>
-        <p:txBody>
-          <a:bodyPr/>
-          <a:lstStyle/>
-          <a:p>
-            <a:endParaRPr/>
-          </a:p>
+          <p:cNvPr id="6" name="Content Placeholder 5"/>
+          <p:cNvSpPr>
+            <a:spLocks noGrp="1"/>
+          </p:cNvSpPr>
+          <p:nvPr>
+            <p:ph idx="4" sz="quarter"/>
+          </p:nvPr>
+        </p:nvSpPr>
+        <p:spPr/>
+        <p:txBody>
+          <a:bodyPr/>
+          <a:lstStyle/>
+          <a:p/>
           <a:p>
             <a:pPr>
               <a:defRPr>
@@ -4611,144 +4637,13 @@
             </a:pPr>
             <a:r>
               <a:t>Utkast: 0</a:t>
-            </a:r>
-          </a:p>
-        </p:txBody>
-      </p:sp>
-      <p:sp>
-        <p:nvSpPr>
-          <p:cNvPr id="5" name="Text Placeholder 4"/>
-          <p:cNvSpPr>
-            <a:spLocks noGrp="1"/>
-          </p:cNvSpPr>
-          <p:nvPr>
-            <p:ph type="body" sz="quarter" idx="3"/>
-          </p:nvPr>
-        </p:nvSpPr>
-        <p:spPr/>
-        <p:txBody>
-          <a:bodyPr/>
-          <a:lstStyle/>
-          <a:p>
-            <a:pPr>
-              <a:defRPr>
-                <a:solidFill>
-                  <a:srgbClr val="FFFEFE"/>
-                </a:solidFill>
-              </a:defRPr>
-            </a:pPr>
-            <a:r>
-              <a:t>Villa - skottförsök: 11</a:t>
-            </a:r>
-          </a:p>
-        </p:txBody>
-      </p:sp>
-      <p:sp>
-        <p:nvSpPr>
-          <p:cNvPr id="6" name="Content Placeholder 5"/>
-          <p:cNvSpPr>
-            <a:spLocks noGrp="1"/>
-          </p:cNvSpPr>
-          <p:nvPr>
-            <p:ph sz="quarter" idx="4"/>
-          </p:nvPr>
-        </p:nvSpPr>
-        <p:spPr/>
-        <p:txBody>
-          <a:bodyPr/>
-          <a:lstStyle/>
-          <a:p>
-            <a:endParaRPr/>
-          </a:p>
-          <a:p>
-            <a:pPr>
-              <a:defRPr>
-                <a:solidFill>
-                  <a:srgbClr val="FFFEFE"/>
-                </a:solidFill>
-              </a:defRPr>
-            </a:pPr>
-            <a:r>
-              <a:t>Boll: 0</a:t>
-            </a:r>
-          </a:p>
-          <a:p>
-            <a:pPr>
-              <a:defRPr>
-                <a:solidFill>
-                  <a:srgbClr val="FFFEFE"/>
-                </a:solidFill>
-              </a:defRPr>
-            </a:pPr>
-            <a:r>
-              <a:t>Bolltapp: 2</a:t>
-            </a:r>
-          </a:p>
-          <a:p>
-            <a:pPr>
-              <a:defRPr>
-                <a:solidFill>
-                  <a:srgbClr val="FFFEFE"/>
-                </a:solidFill>
-              </a:defRPr>
-            </a:pPr>
-            <a:r>
-              <a:t>Frislag: 0</a:t>
-            </a:r>
-          </a:p>
-          <a:p>
-            <a:pPr>
-              <a:defRPr>
-                <a:solidFill>
-                  <a:srgbClr val="FFFEFE"/>
-                </a:solidFill>
-              </a:defRPr>
-            </a:pPr>
-            <a:r>
-              <a:t>Hörna: 6</a:t>
-            </a:r>
-          </a:p>
-          <a:p>
-            <a:pPr>
-              <a:defRPr>
-                <a:solidFill>
-                  <a:srgbClr val="FFFEFE"/>
-                </a:solidFill>
-              </a:defRPr>
-            </a:pPr>
-            <a:r>
-              <a:t>Inslag: 1</a:t>
-            </a:r>
-          </a:p>
-          <a:p>
-            <a:pPr>
-              <a:defRPr>
-                <a:solidFill>
-                  <a:srgbClr val="FFFEFE"/>
-                </a:solidFill>
-              </a:defRPr>
-            </a:pPr>
-            <a:r>
-              <a:t>Offside: 0</a:t>
-            </a:r>
-          </a:p>
-          <a:p>
-            <a:pPr>
-              <a:defRPr>
-                <a:solidFill>
-                  <a:srgbClr val="FFFEFE"/>
-                </a:solidFill>
-              </a:defRPr>
-            </a:pPr>
-            <a:r>
-              <a:t>Utkast: 2</a:t>
             </a:r>
           </a:p>
         </p:txBody>
       </p:sp>
       <p:pic>
         <p:nvPicPr>
-          <p:cNvPr id="7" name="Picture 6" descr="sirius logo.png"/>
+          <p:cNvPr id="7" name="Picture 6" descr="villa logo.png"/>
           <p:cNvPicPr>
             <a:picLocks noChangeAspect="1"/>
           </p:cNvPicPr>
@@ -4772,7 +4667,7 @@
       </p:pic>
       <p:pic>
         <p:nvPicPr>
-          <p:cNvPr id="8" name="Picture 7" descr="villa logo.png"/>
+          <p:cNvPr id="8" name="Picture 7" descr="sirius logo.png"/>
           <p:cNvPicPr>
             <a:picLocks noChangeAspect="1"/>
           </p:cNvPicPr>
@@ -4803,7 +4698,7 @@
 </file>
 
 <file path=ppt/slides/slide7.xml><?xml version="1.0" encoding="utf-8"?>
-<p:sld xmlns:a="http://schemas.openxmlformats.org/drawingml/2006/main" xmlns:r="http://schemas.openxmlformats.org/officeDocument/2006/relationships" xmlns:p="http://schemas.openxmlformats.org/presentationml/2006/main">
+<p:sld xmlns:a="http://schemas.openxmlformats.org/drawingml/2006/main" xmlns:p="http://schemas.openxmlformats.org/presentationml/2006/main" xmlns:r="http://schemas.openxmlformats.org/officeDocument/2006/relationships">
   <p:cSld>
     <p:bg>
       <p:bgPr>
@@ -4819,14 +4714,7 @@
         <p:cNvGrpSpPr/>
         <p:nvPr/>
       </p:nvGrpSpPr>
-      <p:grpSpPr>
-        <a:xfrm>
-          <a:off x="0" y="0"/>
-          <a:ext cx="0" cy="0"/>
-          <a:chOff x="0" y="0"/>
-          <a:chExt cx="0" cy="0"/>
-        </a:xfrm>
-      </p:grpSpPr>
+      <p:grpSpPr/>
       <p:sp>
         <p:nvSpPr>
           <p:cNvPr id="2" name="Title 1"/>
@@ -4862,9 +4750,7 @@
         <p:txBody>
           <a:bodyPr/>
           <a:lstStyle/>
-          <a:p>
-            <a:endParaRPr/>
-          </a:p>
+          <a:p/>
           <a:p>
             <a:pPr>
               <a:defRPr>
@@ -4917,7 +4803,7 @@
       </p:sp>
       <p:pic>
         <p:nvPicPr>
-          <p:cNvPr id="4" name="Picture 3" descr="sirius logo.png"/>
+          <p:cNvPr id="4" name="Picture 3" descr="villa logo.png"/>
           <p:cNvPicPr>
             <a:picLocks noChangeAspect="1"/>
           </p:cNvPicPr>
@@ -4941,7 +4827,7 @@
       </p:pic>
       <p:pic>
         <p:nvPicPr>
-          <p:cNvPr id="5" name="Picture 4" descr="villa logo.png"/>
+          <p:cNvPr id="5" name="Picture 4" descr="sirius logo.png"/>
           <p:cNvPicPr>
             <a:picLocks noChangeAspect="1"/>
           </p:cNvPicPr>

</xml_diff>

<commit_message>
tror git har bråkat men det ska fungera nu
</commit_message>
<xml_diff>
--- a/powerpointer/matchrapporter/20220930 IK Sirius - Villa Lidköping halvlek 1 .pptx
+++ b/powerpointer/matchrapporter/20220930 IK Sirius - Villa Lidköping halvlek 1 .pptx
@@ -3087,14 +3087,6 @@
 <file path=ppt/slides/slide1.xml><?xml version="1.0" encoding="utf-8"?>
 <p:sld xmlns:a="http://schemas.openxmlformats.org/drawingml/2006/main" xmlns:p="http://schemas.openxmlformats.org/presentationml/2006/main" xmlns:r="http://schemas.openxmlformats.org/officeDocument/2006/relationships">
   <p:cSld>
-    <p:bg>
-      <p:bgPr>
-        <a:solidFill>
-          <a:srgbClr val="BEBEBE"/>
-        </a:solidFill>
-        <a:effectLst/>
-      </p:bgPr>
-    </p:bg>
     <p:spTree>
       <p:nvGrpSpPr>
         <p:cNvPr id="1" name=""/>
@@ -3102,65 +3094,9 @@
         <p:nvPr/>
       </p:nvGrpSpPr>
       <p:grpSpPr/>
-      <p:sp>
-        <p:nvSpPr>
-          <p:cNvPr id="2" name="Title 1"/>
-          <p:cNvSpPr>
-            <a:spLocks noGrp="1"/>
-          </p:cNvSpPr>
-          <p:nvPr>
-            <p:ph type="ctrTitle"/>
-          </p:nvPr>
-        </p:nvSpPr>
-        <p:spPr/>
-        <p:txBody>
-          <a:bodyPr/>
-          <a:lstStyle/>
-          <a:p>
-            <a:pPr>
-              <a:defRPr>
-                <a:solidFill>
-                  <a:srgbClr val="000000"/>
-                </a:solidFill>
-              </a:defRPr>
-            </a:pPr>
-            <a:r>
-              <a:t>Villa Lidköping BK - IK Sirius</a:t>
-            </a:r>
-          </a:p>
-        </p:txBody>
-      </p:sp>
-      <p:sp>
-        <p:nvSpPr>
-          <p:cNvPr id="3" name="Subtitle 2"/>
-          <p:cNvSpPr>
-            <a:spLocks noGrp="1"/>
-          </p:cNvSpPr>
-          <p:nvPr>
-            <p:ph type="subTitle" idx="1"/>
-          </p:nvPr>
-        </p:nvSpPr>
-        <p:spPr/>
-        <p:txBody>
-          <a:bodyPr/>
-          <a:lstStyle/>
-          <a:p>
-            <a:pPr>
-              <a:defRPr>
-                <a:solidFill>
-                  <a:srgbClr val="FAE20C"/>
-                </a:solidFill>
-              </a:defRPr>
-            </a:pPr>
-            <a:r>
-              <a:t>4 - 0</a:t>
-            </a:r>
-          </a:p>
-        </p:txBody>
-      </p:sp>
       <p:pic>
         <p:nvPicPr>
-          <p:cNvPr id="4" name="Picture 3" descr="villa logo.png"/>
+          <p:cNvPr id="4" name="Picture 3" descr="background.png"/>
           <p:cNvPicPr>
             <a:picLocks noChangeAspect="1"/>
           </p:cNvPicPr>
@@ -3168,6 +3104,86 @@
         </p:nvPicPr>
         <p:blipFill>
           <a:blip r:embed="rId2"/>
+          <a:stretch>
+            <a:fillRect/>
+          </a:stretch>
+        </p:blipFill>
+        <p:spPr>
+          <a:xfrm>
+            <a:off x="0" y="0"/>
+            <a:ext cx="9144000" cy="6858000"/>
+          </a:xfrm>
+          <a:prstGeom prst="rect">
+            <a:avLst/>
+          </a:prstGeom>
+        </p:spPr>
+      </p:pic>
+      <p:sp>
+        <p:nvSpPr>
+          <p:cNvPr id="2" name="Title 1"/>
+          <p:cNvSpPr>
+            <a:spLocks noGrp="1"/>
+          </p:cNvSpPr>
+          <p:nvPr>
+            <p:ph type="ctrTitle"/>
+          </p:nvPr>
+        </p:nvSpPr>
+        <p:spPr/>
+        <p:txBody>
+          <a:bodyPr/>
+          <a:lstStyle/>
+          <a:p>
+            <a:pPr>
+              <a:defRPr>
+                <a:solidFill>
+                  <a:srgbClr val="000000"/>
+                </a:solidFill>
+              </a:defRPr>
+            </a:pPr>
+            <a:r>
+              <a:t>IK Sirius - Villa Lidköping BK</a:t>
+            </a:r>
+          </a:p>
+        </p:txBody>
+      </p:sp>
+      <p:sp>
+        <p:nvSpPr>
+          <p:cNvPr id="3" name="Subtitle 2"/>
+          <p:cNvSpPr>
+            <a:spLocks noGrp="1"/>
+          </p:cNvSpPr>
+          <p:nvPr>
+            <p:ph type="subTitle" idx="1"/>
+          </p:nvPr>
+        </p:nvSpPr>
+        <p:spPr/>
+        <p:txBody>
+          <a:bodyPr/>
+          <a:lstStyle/>
+          <a:p>
+            <a:pPr>
+              <a:defRPr>
+                <a:solidFill>
+                  <a:srgbClr val="FAE20C"/>
+                </a:solidFill>
+              </a:defRPr>
+            </a:pPr>
+            <a:r>
+              <a:t>0 - 4</a:t>
+            </a:r>
+          </a:p>
+        </p:txBody>
+      </p:sp>
+      <p:pic>
+        <p:nvPicPr>
+          <p:cNvPr id="5" name="Picture 4" descr="sirius logo.png"/>
+          <p:cNvPicPr>
+            <a:picLocks noChangeAspect="1"/>
+          </p:cNvPicPr>
+          <p:nvPr/>
+        </p:nvPicPr>
+        <p:blipFill>
+          <a:blip r:embed="rId3"/>
           <a:stretch>
             <a:fillRect/>
           </a:stretch>
@@ -3184,14 +3200,14 @@
       </p:pic>
       <p:pic>
         <p:nvPicPr>
-          <p:cNvPr id="5" name="Picture 4" descr="sirius logo.png"/>
+          <p:cNvPr id="6" name="Picture 5" descr="villa logo.png"/>
           <p:cNvPicPr>
             <a:picLocks noChangeAspect="1"/>
           </p:cNvPicPr>
           <p:nvPr/>
         </p:nvPicPr>
         <p:blipFill>
-          <a:blip r:embed="rId3"/>
+          <a:blip r:embed="rId4"/>
           <a:stretch>
             <a:fillRect/>
           </a:stretch>
@@ -3217,14 +3233,6 @@
 <file path=ppt/slides/slide2.xml><?xml version="1.0" encoding="utf-8"?>
 <p:sld xmlns:a="http://schemas.openxmlformats.org/drawingml/2006/main" xmlns:p="http://schemas.openxmlformats.org/presentationml/2006/main" xmlns:r="http://schemas.openxmlformats.org/officeDocument/2006/relationships">
   <p:cSld>
-    <p:bg>
-      <p:bgPr>
-        <a:solidFill>
-          <a:srgbClr val="BEBEBE"/>
-        </a:solidFill>
-        <a:effectLst/>
-      </p:bgPr>
-    </p:bg>
     <p:spTree>
       <p:nvGrpSpPr>
         <p:cNvPr id="1" name=""/>
@@ -3232,216 +3240,9 @@
         <p:nvPr/>
       </p:nvGrpSpPr>
       <p:grpSpPr/>
-      <p:sp>
-        <p:nvSpPr>
-          <p:cNvPr id="2" name="Title 1"/>
-          <p:cNvSpPr>
-            <a:spLocks noGrp="1"/>
-          </p:cNvSpPr>
-          <p:nvPr>
-            <p:ph type="title"/>
-          </p:nvPr>
-        </p:nvSpPr>
-        <p:spPr/>
-        <p:txBody>
-          <a:bodyPr/>
-          <a:lstStyle/>
-          <a:p>
-            <a:r>
-              <a:t>Matchstatistik</a:t>
-            </a:r>
-          </a:p>
-        </p:txBody>
-      </p:sp>
-      <p:sp>
-        <p:nvSpPr>
-          <p:cNvPr id="3" name="Text Placeholder 2"/>
-          <p:cNvSpPr>
-            <a:spLocks noGrp="1"/>
-          </p:cNvSpPr>
-          <p:nvPr>
-            <p:ph type="body" idx="1"/>
-          </p:nvPr>
-        </p:nvSpPr>
-        <p:spPr/>
-        <p:txBody>
-          <a:bodyPr/>
-          <a:lstStyle/>
-          <a:p>
-            <a:pPr>
-              <a:defRPr>
-                <a:solidFill>
-                  <a:srgbClr val="FFFEFE"/>
-                </a:solidFill>
-              </a:defRPr>
-            </a:pPr>
-            <a:r>
-              <a:t>Villa</a:t>
-            </a:r>
-          </a:p>
-        </p:txBody>
-      </p:sp>
-      <p:sp>
-        <p:nvSpPr>
-          <p:cNvPr id="4" name="Content Placeholder 3"/>
-          <p:cNvSpPr>
-            <a:spLocks noGrp="1"/>
-          </p:cNvSpPr>
-          <p:nvPr>
-            <p:ph idx="2" sz="half"/>
-          </p:nvPr>
-        </p:nvSpPr>
-        <p:spPr/>
-        <p:txBody>
-          <a:bodyPr/>
-          <a:lstStyle/>
-          <a:p/>
-          <a:p>
-            <a:pPr>
-              <a:defRPr>
-                <a:solidFill>
-                  <a:srgbClr val="FFFEFE"/>
-                </a:solidFill>
-              </a:defRPr>
-            </a:pPr>
-            <a:r>
-              <a:t>Resultat: </a:t>
-            </a:r>
-            <a:br/>
-            <a:r>
-              <a:t>	4</a:t>
-            </a:r>
-          </a:p>
-          <a:p>
-            <a:pPr>
-              <a:defRPr>
-                <a:solidFill>
-                  <a:srgbClr val="FFFEFE"/>
-                </a:solidFill>
-              </a:defRPr>
-            </a:pPr>
-            <a:r>
-              <a:t>Skott på mål: </a:t>
-            </a:r>
-            <a:br/>
-            <a:r>
-              <a:t>	7</a:t>
-            </a:r>
-          </a:p>
-          <a:p>
-            <a:pPr>
-              <a:defRPr>
-                <a:solidFill>
-                  <a:srgbClr val="FFFEFE"/>
-                </a:solidFill>
-              </a:defRPr>
-            </a:pPr>
-            <a:r>
-              <a:t>Bollinnehav: </a:t>
-            </a:r>
-            <a:br/>
-            <a:r>
-              <a:t>	0:11:21</a:t>
-            </a:r>
-          </a:p>
-        </p:txBody>
-      </p:sp>
-      <p:sp>
-        <p:nvSpPr>
-          <p:cNvPr id="5" name="Text Placeholder 4"/>
-          <p:cNvSpPr>
-            <a:spLocks noGrp="1"/>
-          </p:cNvSpPr>
-          <p:nvPr>
-            <p:ph type="body" idx="3" sz="quarter"/>
-          </p:nvPr>
-        </p:nvSpPr>
-        <p:spPr/>
-        <p:txBody>
-          <a:bodyPr/>
-          <a:lstStyle/>
-          <a:p>
-            <a:pPr>
-              <a:defRPr>
-                <a:solidFill>
-                  <a:srgbClr val="000000"/>
-                </a:solidFill>
-              </a:defRPr>
-            </a:pPr>
-            <a:r>
-              <a:t>Sirius</a:t>
-            </a:r>
-          </a:p>
-        </p:txBody>
-      </p:sp>
-      <p:sp>
-        <p:nvSpPr>
-          <p:cNvPr id="6" name="Content Placeholder 5"/>
-          <p:cNvSpPr>
-            <a:spLocks noGrp="1"/>
-          </p:cNvSpPr>
-          <p:nvPr>
-            <p:ph idx="4" sz="quarter"/>
-          </p:nvPr>
-        </p:nvSpPr>
-        <p:spPr/>
-        <p:txBody>
-          <a:bodyPr/>
-          <a:lstStyle/>
-          <a:p/>
-          <a:p>
-            <a:pPr>
-              <a:defRPr>
-                <a:solidFill>
-                  <a:srgbClr val="000000"/>
-                </a:solidFill>
-              </a:defRPr>
-            </a:pPr>
-            <a:r>
-              <a:t>Resultat: </a:t>
-            </a:r>
-            <a:br/>
-            <a:r>
-              <a:t>	0</a:t>
-            </a:r>
-          </a:p>
-          <a:p>
-            <a:pPr>
-              <a:defRPr>
-                <a:solidFill>
-                  <a:srgbClr val="000000"/>
-                </a:solidFill>
-              </a:defRPr>
-            </a:pPr>
-            <a:r>
-              <a:t>Skott på mål: </a:t>
-            </a:r>
-            <a:br/>
-            <a:r>
-              <a:t>	1</a:t>
-            </a:r>
-          </a:p>
-          <a:p>
-            <a:pPr>
-              <a:defRPr>
-                <a:solidFill>
-                  <a:srgbClr val="000000"/>
-                </a:solidFill>
-              </a:defRPr>
-            </a:pPr>
-            <a:r>
-              <a:t>Bollinnehav: </a:t>
-            </a:r>
-            <a:br/>
-            <a:r>
-              <a:t>	0:12:31</a:t>
-            </a:r>
-          </a:p>
-        </p:txBody>
-      </p:sp>
       <p:pic>
         <p:nvPicPr>
-          <p:cNvPr id="7" name="Picture 6" descr="villa logo.png"/>
+          <p:cNvPr id="7" name="Picture 6" descr="background.png"/>
           <p:cNvPicPr>
             <a:picLocks noChangeAspect="1"/>
           </p:cNvPicPr>
@@ -3449,6 +3250,237 @@
         </p:nvPicPr>
         <p:blipFill>
           <a:blip r:embed="rId2"/>
+          <a:stretch>
+            <a:fillRect/>
+          </a:stretch>
+        </p:blipFill>
+        <p:spPr>
+          <a:xfrm>
+            <a:off x="0" y="0"/>
+            <a:ext cx="9144000" cy="6858000"/>
+          </a:xfrm>
+          <a:prstGeom prst="rect">
+            <a:avLst/>
+          </a:prstGeom>
+        </p:spPr>
+      </p:pic>
+      <p:sp>
+        <p:nvSpPr>
+          <p:cNvPr id="2" name="Title 1"/>
+          <p:cNvSpPr>
+            <a:spLocks noGrp="1"/>
+          </p:cNvSpPr>
+          <p:nvPr>
+            <p:ph type="title"/>
+          </p:nvPr>
+        </p:nvSpPr>
+        <p:spPr/>
+        <p:txBody>
+          <a:bodyPr/>
+          <a:lstStyle/>
+          <a:p>
+            <a:r>
+              <a:t>Matchstatistik</a:t>
+            </a:r>
+          </a:p>
+        </p:txBody>
+      </p:sp>
+      <p:sp>
+        <p:nvSpPr>
+          <p:cNvPr id="3" name="Text Placeholder 2"/>
+          <p:cNvSpPr>
+            <a:spLocks noGrp="1"/>
+          </p:cNvSpPr>
+          <p:nvPr>
+            <p:ph type="body" idx="1"/>
+          </p:nvPr>
+        </p:nvSpPr>
+        <p:spPr/>
+        <p:txBody>
+          <a:bodyPr/>
+          <a:lstStyle/>
+          <a:p>
+            <a:pPr>
+              <a:defRPr>
+                <a:solidFill>
+                  <a:srgbClr val="000000"/>
+                </a:solidFill>
+              </a:defRPr>
+            </a:pPr>
+            <a:r>
+              <a:t>Sirius</a:t>
+            </a:r>
+          </a:p>
+        </p:txBody>
+      </p:sp>
+      <p:sp>
+        <p:nvSpPr>
+          <p:cNvPr id="4" name="Content Placeholder 3"/>
+          <p:cNvSpPr>
+            <a:spLocks noGrp="1"/>
+          </p:cNvSpPr>
+          <p:nvPr>
+            <p:ph idx="2" sz="half"/>
+          </p:nvPr>
+        </p:nvSpPr>
+        <p:spPr/>
+        <p:txBody>
+          <a:bodyPr/>
+          <a:lstStyle/>
+          <a:p/>
+          <a:p>
+            <a:pPr>
+              <a:defRPr>
+                <a:solidFill>
+                  <a:srgbClr val="000000"/>
+                </a:solidFill>
+              </a:defRPr>
+            </a:pPr>
+            <a:r>
+              <a:t>Resultat: </a:t>
+            </a:r>
+            <a:br/>
+            <a:r>
+              <a:t>	0</a:t>
+            </a:r>
+          </a:p>
+          <a:p>
+            <a:pPr>
+              <a:defRPr>
+                <a:solidFill>
+                  <a:srgbClr val="000000"/>
+                </a:solidFill>
+              </a:defRPr>
+            </a:pPr>
+            <a:r>
+              <a:t>Skott på mål: </a:t>
+            </a:r>
+            <a:br/>
+            <a:r>
+              <a:t>	1</a:t>
+            </a:r>
+          </a:p>
+          <a:p>
+            <a:pPr>
+              <a:defRPr>
+                <a:solidFill>
+                  <a:srgbClr val="000000"/>
+                </a:solidFill>
+              </a:defRPr>
+            </a:pPr>
+            <a:r>
+              <a:t>Bollinnehav: </a:t>
+            </a:r>
+            <a:br/>
+            <a:r>
+              <a:t>	0:12:31</a:t>
+            </a:r>
+          </a:p>
+        </p:txBody>
+      </p:sp>
+      <p:sp>
+        <p:nvSpPr>
+          <p:cNvPr id="5" name="Text Placeholder 4"/>
+          <p:cNvSpPr>
+            <a:spLocks noGrp="1"/>
+          </p:cNvSpPr>
+          <p:nvPr>
+            <p:ph type="body" idx="3" sz="quarter"/>
+          </p:nvPr>
+        </p:nvSpPr>
+        <p:spPr/>
+        <p:txBody>
+          <a:bodyPr/>
+          <a:lstStyle/>
+          <a:p>
+            <a:pPr>
+              <a:defRPr>
+                <a:solidFill>
+                  <a:srgbClr val="FFFEFE"/>
+                </a:solidFill>
+              </a:defRPr>
+            </a:pPr>
+            <a:r>
+              <a:t>Villa Lidköping</a:t>
+            </a:r>
+          </a:p>
+        </p:txBody>
+      </p:sp>
+      <p:sp>
+        <p:nvSpPr>
+          <p:cNvPr id="6" name="Content Placeholder 5"/>
+          <p:cNvSpPr>
+            <a:spLocks noGrp="1"/>
+          </p:cNvSpPr>
+          <p:nvPr>
+            <p:ph idx="4" sz="quarter"/>
+          </p:nvPr>
+        </p:nvSpPr>
+        <p:spPr/>
+        <p:txBody>
+          <a:bodyPr/>
+          <a:lstStyle/>
+          <a:p/>
+          <a:p>
+            <a:pPr>
+              <a:defRPr>
+                <a:solidFill>
+                  <a:srgbClr val="FFFEFE"/>
+                </a:solidFill>
+              </a:defRPr>
+            </a:pPr>
+            <a:r>
+              <a:t>Resultat: </a:t>
+            </a:r>
+            <a:br/>
+            <a:r>
+              <a:t>	4</a:t>
+            </a:r>
+          </a:p>
+          <a:p>
+            <a:pPr>
+              <a:defRPr>
+                <a:solidFill>
+                  <a:srgbClr val="FFFEFE"/>
+                </a:solidFill>
+              </a:defRPr>
+            </a:pPr>
+            <a:r>
+              <a:t>Skott på mål: </a:t>
+            </a:r>
+            <a:br/>
+            <a:r>
+              <a:t>	7</a:t>
+            </a:r>
+          </a:p>
+          <a:p>
+            <a:pPr>
+              <a:defRPr>
+                <a:solidFill>
+                  <a:srgbClr val="FFFEFE"/>
+                </a:solidFill>
+              </a:defRPr>
+            </a:pPr>
+            <a:r>
+              <a:t>Bollinnehav: </a:t>
+            </a:r>
+            <a:br/>
+            <a:r>
+              <a:t>	0:11:21</a:t>
+            </a:r>
+          </a:p>
+        </p:txBody>
+      </p:sp>
+      <p:pic>
+        <p:nvPicPr>
+          <p:cNvPr id="8" name="Picture 7" descr="sirius logo.png"/>
+          <p:cNvPicPr>
+            <a:picLocks noChangeAspect="1"/>
+          </p:cNvPicPr>
+          <p:nvPr/>
+        </p:nvPicPr>
+        <p:blipFill>
+          <a:blip r:embed="rId3"/>
           <a:stretch>
             <a:fillRect/>
           </a:stretch>
@@ -3465,14 +3497,14 @@
       </p:pic>
       <p:pic>
         <p:nvPicPr>
-          <p:cNvPr id="8" name="Picture 7" descr="sirius logo.png"/>
+          <p:cNvPr id="9" name="Picture 8" descr="villa logo.png"/>
           <p:cNvPicPr>
             <a:picLocks noChangeAspect="1"/>
           </p:cNvPicPr>
           <p:nvPr/>
         </p:nvPicPr>
         <p:blipFill>
-          <a:blip r:embed="rId3"/>
+          <a:blip r:embed="rId4"/>
           <a:stretch>
             <a:fillRect/>
           </a:stretch>
@@ -3498,14 +3530,6 @@
 <file path=ppt/slides/slide3.xml><?xml version="1.0" encoding="utf-8"?>
 <p:sld xmlns:a="http://schemas.openxmlformats.org/drawingml/2006/main" xmlns:p="http://schemas.openxmlformats.org/presentationml/2006/main" xmlns:r="http://schemas.openxmlformats.org/officeDocument/2006/relationships">
   <p:cSld>
-    <p:bg>
-      <p:bgPr>
-        <a:solidFill>
-          <a:srgbClr val="BEBEBE"/>
-        </a:solidFill>
-        <a:effectLst/>
-      </p:bgPr>
-    </p:bg>
     <p:spTree>
       <p:nvGrpSpPr>
         <p:cNvPr id="1" name=""/>
@@ -3513,216 +3537,9 @@
         <p:nvPr/>
       </p:nvGrpSpPr>
       <p:grpSpPr/>
-      <p:sp>
-        <p:nvSpPr>
-          <p:cNvPr id="2" name="Title 1"/>
-          <p:cNvSpPr>
-            <a:spLocks noGrp="1"/>
-          </p:cNvSpPr>
-          <p:nvPr>
-            <p:ph type="title"/>
-          </p:nvPr>
-        </p:nvSpPr>
-        <p:spPr/>
-        <p:txBody>
-          <a:bodyPr/>
-          <a:lstStyle/>
-          <a:p>
-            <a:r>
-              <a:t>Bollvinster</a:t>
-            </a:r>
-          </a:p>
-        </p:txBody>
-      </p:sp>
-      <p:sp>
-        <p:nvSpPr>
-          <p:cNvPr id="3" name="Text Placeholder 2"/>
-          <p:cNvSpPr>
-            <a:spLocks noGrp="1"/>
-          </p:cNvSpPr>
-          <p:nvPr>
-            <p:ph type="body" idx="1"/>
-          </p:nvPr>
-        </p:nvSpPr>
-        <p:spPr/>
-        <p:txBody>
-          <a:bodyPr/>
-          <a:lstStyle/>
-          <a:p>
-            <a:pPr>
-              <a:defRPr>
-                <a:solidFill>
-                  <a:srgbClr val="FFFEFE"/>
-                </a:solidFill>
-              </a:defRPr>
-            </a:pPr>
-            <a:r>
-              <a:t>Villa</a:t>
-            </a:r>
-          </a:p>
-        </p:txBody>
-      </p:sp>
-      <p:sp>
-        <p:nvSpPr>
-          <p:cNvPr id="4" name="Content Placeholder 3"/>
-          <p:cNvSpPr>
-            <a:spLocks noGrp="1"/>
-          </p:cNvSpPr>
-          <p:nvPr>
-            <p:ph idx="2" sz="half"/>
-          </p:nvPr>
-        </p:nvSpPr>
-        <p:spPr/>
-        <p:txBody>
-          <a:bodyPr/>
-          <a:lstStyle/>
-          <a:p/>
-          <a:p>
-            <a:pPr>
-              <a:defRPr>
-                <a:solidFill>
-                  <a:srgbClr val="FFFEFE"/>
-                </a:solidFill>
-              </a:defRPr>
-            </a:pPr>
-            <a:r>
-              <a:t>Vunna närkamper: </a:t>
-            </a:r>
-            <a:br/>
-            <a:r>
-              <a:t>	5</a:t>
-            </a:r>
-          </a:p>
-          <a:p>
-            <a:pPr>
-              <a:defRPr>
-                <a:solidFill>
-                  <a:srgbClr val="FFFEFE"/>
-                </a:solidFill>
-              </a:defRPr>
-            </a:pPr>
-            <a:r>
-              <a:t>Brytningar: </a:t>
-            </a:r>
-            <a:br/>
-            <a:r>
-              <a:t>	1</a:t>
-            </a:r>
-          </a:p>
-          <a:p>
-            <a:pPr>
-              <a:defRPr>
-                <a:solidFill>
-                  <a:srgbClr val="FFFEFE"/>
-                </a:solidFill>
-              </a:defRPr>
-            </a:pPr>
-            <a:r>
-              <a:t>Bolltapp: </a:t>
-            </a:r>
-            <a:br/>
-            <a:r>
-              <a:t>	0</a:t>
-            </a:r>
-          </a:p>
-        </p:txBody>
-      </p:sp>
-      <p:sp>
-        <p:nvSpPr>
-          <p:cNvPr id="5" name="Text Placeholder 4"/>
-          <p:cNvSpPr>
-            <a:spLocks noGrp="1"/>
-          </p:cNvSpPr>
-          <p:nvPr>
-            <p:ph type="body" idx="3" sz="quarter"/>
-          </p:nvPr>
-        </p:nvSpPr>
-        <p:spPr/>
-        <p:txBody>
-          <a:bodyPr/>
-          <a:lstStyle/>
-          <a:p>
-            <a:pPr>
-              <a:defRPr>
-                <a:solidFill>
-                  <a:srgbClr val="000000"/>
-                </a:solidFill>
-              </a:defRPr>
-            </a:pPr>
-            <a:r>
-              <a:t>Sirius</a:t>
-            </a:r>
-          </a:p>
-        </p:txBody>
-      </p:sp>
-      <p:sp>
-        <p:nvSpPr>
-          <p:cNvPr id="6" name="Content Placeholder 5"/>
-          <p:cNvSpPr>
-            <a:spLocks noGrp="1"/>
-          </p:cNvSpPr>
-          <p:nvPr>
-            <p:ph idx="4" sz="quarter"/>
-          </p:nvPr>
-        </p:nvSpPr>
-        <p:spPr/>
-        <p:txBody>
-          <a:bodyPr/>
-          <a:lstStyle/>
-          <a:p/>
-          <a:p>
-            <a:pPr>
-              <a:defRPr>
-                <a:solidFill>
-                  <a:srgbClr val="000000"/>
-                </a:solidFill>
-              </a:defRPr>
-            </a:pPr>
-            <a:r>
-              <a:t>Vunna närkamper: </a:t>
-            </a:r>
-            <a:br/>
-            <a:r>
-              <a:t>	4</a:t>
-            </a:r>
-          </a:p>
-          <a:p>
-            <a:pPr>
-              <a:defRPr>
-                <a:solidFill>
-                  <a:srgbClr val="000000"/>
-                </a:solidFill>
-              </a:defRPr>
-            </a:pPr>
-            <a:r>
-              <a:t>Brytningar: </a:t>
-            </a:r>
-            <a:br/>
-            <a:r>
-              <a:t>	2</a:t>
-            </a:r>
-          </a:p>
-          <a:p>
-            <a:pPr>
-              <a:defRPr>
-                <a:solidFill>
-                  <a:srgbClr val="000000"/>
-                </a:solidFill>
-              </a:defRPr>
-            </a:pPr>
-            <a:r>
-              <a:t>Bolltapp: </a:t>
-            </a:r>
-            <a:br/>
-            <a:r>
-              <a:t>	8</a:t>
-            </a:r>
-          </a:p>
-        </p:txBody>
-      </p:sp>
       <p:pic>
         <p:nvPicPr>
-          <p:cNvPr id="7" name="Picture 6" descr="villa logo.png"/>
+          <p:cNvPr id="7" name="Picture 6" descr="background.png"/>
           <p:cNvPicPr>
             <a:picLocks noChangeAspect="1"/>
           </p:cNvPicPr>
@@ -3730,6 +3547,237 @@
         </p:nvPicPr>
         <p:blipFill>
           <a:blip r:embed="rId2"/>
+          <a:stretch>
+            <a:fillRect/>
+          </a:stretch>
+        </p:blipFill>
+        <p:spPr>
+          <a:xfrm>
+            <a:off x="0" y="0"/>
+            <a:ext cx="9144000" cy="6858000"/>
+          </a:xfrm>
+          <a:prstGeom prst="rect">
+            <a:avLst/>
+          </a:prstGeom>
+        </p:spPr>
+      </p:pic>
+      <p:sp>
+        <p:nvSpPr>
+          <p:cNvPr id="2" name="Title 1"/>
+          <p:cNvSpPr>
+            <a:spLocks noGrp="1"/>
+          </p:cNvSpPr>
+          <p:nvPr>
+            <p:ph type="title"/>
+          </p:nvPr>
+        </p:nvSpPr>
+        <p:spPr/>
+        <p:txBody>
+          <a:bodyPr/>
+          <a:lstStyle/>
+          <a:p>
+            <a:r>
+              <a:t>Bollvinster</a:t>
+            </a:r>
+          </a:p>
+        </p:txBody>
+      </p:sp>
+      <p:sp>
+        <p:nvSpPr>
+          <p:cNvPr id="3" name="Text Placeholder 2"/>
+          <p:cNvSpPr>
+            <a:spLocks noGrp="1"/>
+          </p:cNvSpPr>
+          <p:nvPr>
+            <p:ph type="body" idx="1"/>
+          </p:nvPr>
+        </p:nvSpPr>
+        <p:spPr/>
+        <p:txBody>
+          <a:bodyPr/>
+          <a:lstStyle/>
+          <a:p>
+            <a:pPr>
+              <a:defRPr>
+                <a:solidFill>
+                  <a:srgbClr val="000000"/>
+                </a:solidFill>
+              </a:defRPr>
+            </a:pPr>
+            <a:r>
+              <a:t>Sirius</a:t>
+            </a:r>
+          </a:p>
+        </p:txBody>
+      </p:sp>
+      <p:sp>
+        <p:nvSpPr>
+          <p:cNvPr id="4" name="Content Placeholder 3"/>
+          <p:cNvSpPr>
+            <a:spLocks noGrp="1"/>
+          </p:cNvSpPr>
+          <p:nvPr>
+            <p:ph idx="2" sz="half"/>
+          </p:nvPr>
+        </p:nvSpPr>
+        <p:spPr/>
+        <p:txBody>
+          <a:bodyPr/>
+          <a:lstStyle/>
+          <a:p/>
+          <a:p>
+            <a:pPr>
+              <a:defRPr>
+                <a:solidFill>
+                  <a:srgbClr val="000000"/>
+                </a:solidFill>
+              </a:defRPr>
+            </a:pPr>
+            <a:r>
+              <a:t>Vunna närkamper: </a:t>
+            </a:r>
+            <a:br/>
+            <a:r>
+              <a:t>	4</a:t>
+            </a:r>
+          </a:p>
+          <a:p>
+            <a:pPr>
+              <a:defRPr>
+                <a:solidFill>
+                  <a:srgbClr val="000000"/>
+                </a:solidFill>
+              </a:defRPr>
+            </a:pPr>
+            <a:r>
+              <a:t>Brytningar: </a:t>
+            </a:r>
+            <a:br/>
+            <a:r>
+              <a:t>	2</a:t>
+            </a:r>
+          </a:p>
+          <a:p>
+            <a:pPr>
+              <a:defRPr>
+                <a:solidFill>
+                  <a:srgbClr val="000000"/>
+                </a:solidFill>
+              </a:defRPr>
+            </a:pPr>
+            <a:r>
+              <a:t>Bolltapp: </a:t>
+            </a:r>
+            <a:br/>
+            <a:r>
+              <a:t>	8</a:t>
+            </a:r>
+          </a:p>
+        </p:txBody>
+      </p:sp>
+      <p:sp>
+        <p:nvSpPr>
+          <p:cNvPr id="5" name="Text Placeholder 4"/>
+          <p:cNvSpPr>
+            <a:spLocks noGrp="1"/>
+          </p:cNvSpPr>
+          <p:nvPr>
+            <p:ph type="body" idx="3" sz="quarter"/>
+          </p:nvPr>
+        </p:nvSpPr>
+        <p:spPr/>
+        <p:txBody>
+          <a:bodyPr/>
+          <a:lstStyle/>
+          <a:p>
+            <a:pPr>
+              <a:defRPr>
+                <a:solidFill>
+                  <a:srgbClr val="FFFEFE"/>
+                </a:solidFill>
+              </a:defRPr>
+            </a:pPr>
+            <a:r>
+              <a:t>Villa Lidköping</a:t>
+            </a:r>
+          </a:p>
+        </p:txBody>
+      </p:sp>
+      <p:sp>
+        <p:nvSpPr>
+          <p:cNvPr id="6" name="Content Placeholder 5"/>
+          <p:cNvSpPr>
+            <a:spLocks noGrp="1"/>
+          </p:cNvSpPr>
+          <p:nvPr>
+            <p:ph idx="4" sz="quarter"/>
+          </p:nvPr>
+        </p:nvSpPr>
+        <p:spPr/>
+        <p:txBody>
+          <a:bodyPr/>
+          <a:lstStyle/>
+          <a:p/>
+          <a:p>
+            <a:pPr>
+              <a:defRPr>
+                <a:solidFill>
+                  <a:srgbClr val="FFFEFE"/>
+                </a:solidFill>
+              </a:defRPr>
+            </a:pPr>
+            <a:r>
+              <a:t>Vunna närkamper: </a:t>
+            </a:r>
+            <a:br/>
+            <a:r>
+              <a:t>	5</a:t>
+            </a:r>
+          </a:p>
+          <a:p>
+            <a:pPr>
+              <a:defRPr>
+                <a:solidFill>
+                  <a:srgbClr val="FFFEFE"/>
+                </a:solidFill>
+              </a:defRPr>
+            </a:pPr>
+            <a:r>
+              <a:t>Brytningar: </a:t>
+            </a:r>
+            <a:br/>
+            <a:r>
+              <a:t>	1</a:t>
+            </a:r>
+          </a:p>
+          <a:p>
+            <a:pPr>
+              <a:defRPr>
+                <a:solidFill>
+                  <a:srgbClr val="FFFEFE"/>
+                </a:solidFill>
+              </a:defRPr>
+            </a:pPr>
+            <a:r>
+              <a:t>Bolltapp: </a:t>
+            </a:r>
+            <a:br/>
+            <a:r>
+              <a:t>	0</a:t>
+            </a:r>
+          </a:p>
+        </p:txBody>
+      </p:sp>
+      <p:pic>
+        <p:nvPicPr>
+          <p:cNvPr id="8" name="Picture 7" descr="sirius logo.png"/>
+          <p:cNvPicPr>
+            <a:picLocks noChangeAspect="1"/>
+          </p:cNvPicPr>
+          <p:nvPr/>
+        </p:nvPicPr>
+        <p:blipFill>
+          <a:blip r:embed="rId3"/>
           <a:stretch>
             <a:fillRect/>
           </a:stretch>
@@ -3746,14 +3794,14 @@
       </p:pic>
       <p:pic>
         <p:nvPicPr>
-          <p:cNvPr id="8" name="Picture 7" descr="sirius logo.png"/>
+          <p:cNvPr id="9" name="Picture 8" descr="villa logo.png"/>
           <p:cNvPicPr>
             <a:picLocks noChangeAspect="1"/>
           </p:cNvPicPr>
           <p:nvPr/>
         </p:nvPicPr>
         <p:blipFill>
-          <a:blip r:embed="rId3"/>
+          <a:blip r:embed="rId4"/>
           <a:stretch>
             <a:fillRect/>
           </a:stretch>
@@ -3779,14 +3827,6 @@
 <file path=ppt/slides/slide4.xml><?xml version="1.0" encoding="utf-8"?>
 <p:sld xmlns:a="http://schemas.openxmlformats.org/drawingml/2006/main" xmlns:p="http://schemas.openxmlformats.org/presentationml/2006/main" xmlns:r="http://schemas.openxmlformats.org/officeDocument/2006/relationships">
   <p:cSld>
-    <p:bg>
-      <p:bgPr>
-        <a:solidFill>
-          <a:srgbClr val="BEBEBE"/>
-        </a:solidFill>
-        <a:effectLst/>
-      </p:bgPr>
-    </p:bg>
     <p:spTree>
       <p:nvGrpSpPr>
         <p:cNvPr id="1" name=""/>
@@ -3794,35 +3834,9 @@
         <p:nvPr/>
       </p:nvGrpSpPr>
       <p:grpSpPr/>
-      <p:sp>
-        <p:nvSpPr>
-          <p:cNvPr id="2" name="Title 1"/>
-          <p:cNvSpPr>
-            <a:spLocks noGrp="1"/>
-          </p:cNvSpPr>
-          <p:nvPr>
-            <p:ph type="title"/>
-          </p:nvPr>
-        </p:nvSpPr>
-        <p:spPr/>
-        <p:txBody>
-          <a:bodyPr/>
-          <a:lstStyle/>
-          <a:p>
-            <a:r>
-              <a:t>Närkamper </a:t>
-            </a:r>
-          </a:p>
-          <a:p>
-            <a:r>
-              <a:t>och deras utfall</a:t>
-            </a:r>
-          </a:p>
-        </p:txBody>
-      </p:sp>
       <p:pic>
         <p:nvPicPr>
-          <p:cNvPr id="3" name="Picture 2" descr="villa logo.png"/>
+          <p:cNvPr id="3" name="Picture 2" descr="background.png"/>
           <p:cNvPicPr>
             <a:picLocks noChangeAspect="1"/>
           </p:cNvPicPr>
@@ -3830,6 +3844,56 @@
         </p:nvPicPr>
         <p:blipFill>
           <a:blip r:embed="rId2"/>
+          <a:stretch>
+            <a:fillRect/>
+          </a:stretch>
+        </p:blipFill>
+        <p:spPr>
+          <a:xfrm>
+            <a:off x="0" y="0"/>
+            <a:ext cx="9144000" cy="6858000"/>
+          </a:xfrm>
+          <a:prstGeom prst="rect">
+            <a:avLst/>
+          </a:prstGeom>
+        </p:spPr>
+      </p:pic>
+      <p:sp>
+        <p:nvSpPr>
+          <p:cNvPr id="2" name="Title 1"/>
+          <p:cNvSpPr>
+            <a:spLocks noGrp="1"/>
+          </p:cNvSpPr>
+          <p:nvPr>
+            <p:ph type="title"/>
+          </p:nvPr>
+        </p:nvSpPr>
+        <p:spPr/>
+        <p:txBody>
+          <a:bodyPr/>
+          <a:lstStyle/>
+          <a:p>
+            <a:r>
+              <a:t>Närkamper </a:t>
+            </a:r>
+          </a:p>
+          <a:p>
+            <a:r>
+              <a:t>och deras utfall</a:t>
+            </a:r>
+          </a:p>
+        </p:txBody>
+      </p:sp>
+      <p:pic>
+        <p:nvPicPr>
+          <p:cNvPr id="4" name="Picture 3" descr="sirius logo.png"/>
+          <p:cNvPicPr>
+            <a:picLocks noChangeAspect="1"/>
+          </p:cNvPicPr>
+          <p:nvPr/>
+        </p:nvPicPr>
+        <p:blipFill>
+          <a:blip r:embed="rId3"/>
           <a:stretch>
             <a:fillRect/>
           </a:stretch>
@@ -3846,14 +3910,14 @@
       </p:pic>
       <p:pic>
         <p:nvPicPr>
-          <p:cNvPr id="4" name="Picture 3" descr="sirius logo.png"/>
+          <p:cNvPr id="5" name="Picture 4" descr="villa logo.png"/>
           <p:cNvPicPr>
             <a:picLocks noChangeAspect="1"/>
           </p:cNvPicPr>
           <p:nvPr/>
         </p:nvPicPr>
         <p:blipFill>
-          <a:blip r:embed="rId3"/>
+          <a:blip r:embed="rId4"/>
           <a:stretch>
             <a:fillRect/>
           </a:stretch>
@@ -3870,7 +3934,7 @@
       </p:pic>
       <p:graphicFrame>
         <p:nvGraphicFramePr>
-          <p:cNvPr id="5" name="Table 4"/>
+          <p:cNvPr id="6" name="Table 5"/>
           <p:cNvGraphicFramePr>
             <a:graphicFrameLocks noGrp="1"/>
           </p:cNvGraphicFramePr>
@@ -3903,8 +3967,90 @@
                     </a:p>
                   </a:txBody>
                   <a:tcPr anchor="ctr">
+                    <a:noFill/>
+                  </a:tcPr>
+                </a:tc>
+                <a:tc>
+                  <a:txBody>
+                    <a:bodyPr/>
+                    <a:lstStyle/>
+                    <a:p>
+                      <a:pPr algn="ctr">
+                        <a:defRPr sz="2500" b="1">
+                          <a:solidFill>
+                            <a:srgbClr val="000000"/>
+                          </a:solidFill>
+                        </a:defRPr>
+                      </a:pPr>
+                      <a:r>
+                        <a:t>Efter Sirius</a:t>
+                      </a:r>
+                    </a:p>
+                  </a:txBody>
+                  <a:tcPr anchor="ctr">
+                    <a:noFill/>
+                  </a:tcPr>
+                </a:tc>
+                <a:tc>
+                  <a:txBody>
+                    <a:bodyPr/>
+                    <a:lstStyle/>
+                    <a:p>
+                      <a:pPr algn="ctr">
+                        <a:defRPr sz="2500" b="1">
+                          <a:solidFill>
+                            <a:srgbClr val="FFFEFE"/>
+                          </a:solidFill>
+                        </a:defRPr>
+                      </a:pPr>
+                      <a:r>
+                        <a:t>Efter Villa Lidköping</a:t>
+                      </a:r>
+                    </a:p>
+                  </a:txBody>
+                  <a:tcPr anchor="ctr">
+                    <a:noFill/>
+                  </a:tcPr>
+                </a:tc>
+              </a:tr>
+              <a:tr h="1219200">
+                <a:tc>
+                  <a:txBody>
+                    <a:bodyPr/>
+                    <a:lstStyle/>
+                    <a:p>
+                      <a:pPr algn="ctr">
+                        <a:defRPr sz="2500" b="1">
+                          <a:solidFill>
+                            <a:srgbClr val="000000"/>
+                          </a:solidFill>
+                        </a:defRPr>
+                      </a:pPr>
+                      <a:r>
+                        <a:t>Före Sirius</a:t>
+                      </a:r>
+                    </a:p>
+                  </a:txBody>
+                  <a:tcPr anchor="ctr">
+                    <a:noFill/>
+                  </a:tcPr>
+                </a:tc>
+                <a:tc>
+                  <a:txBody>
+                    <a:bodyPr/>
+                    <a:lstStyle/>
+                    <a:p>
+                      <a:pPr algn="ctr">
+                        <a:defRPr sz="2500" b="1"/>
+                      </a:pPr>
+                      <a:r>
+                        <a:t>1</a:t>
+                      </a:r>
+                    </a:p>
+                  </a:txBody>
+                  <a:tcPr anchor="ctr">
                     <a:solidFill>
-                      <a:srgbClr val="BEBEBE"/>
+                      <a:srgbClr val="427CBC"/>
                     </a:solidFill>
                   </a:tcPr>
                 </a:tc>
@@ -3917,11 +4063,38 @@
                         <a:defRPr sz="2500" b="1"/>
                       </a:pPr>
                       <a:r>
-                        <a:t>Efter Villa</a:t>
+                        <a:t>6</a:t>
                       </a:r>
                     </a:p>
                   </a:txBody>
-                  <a:tcPr anchor="ctr"/>
+                  <a:tcPr anchor="ctr">
+                    <a:solidFill>
+                      <a:srgbClr val="204498"/>
+                    </a:solidFill>
+                  </a:tcPr>
+                </a:tc>
+              </a:tr>
+              <a:tr h="1219200">
+                <a:tc>
+                  <a:txBody>
+                    <a:bodyPr/>
+                    <a:lstStyle/>
+                    <a:p>
+                      <a:pPr algn="ctr">
+                        <a:defRPr sz="2500" b="1">
+                          <a:solidFill>
+                            <a:srgbClr val="FFFEFE"/>
+                          </a:solidFill>
+                        </a:defRPr>
+                      </a:pPr>
+                      <a:r>
+                        <a:t>Före Villa Lidköping</a:t>
+                      </a:r>
+                    </a:p>
+                  </a:txBody>
+                  <a:tcPr anchor="ctr">
+                    <a:noFill/>
+                  </a:tcPr>
                 </a:tc>
                 <a:tc>
                   <a:txBody>
@@ -3932,28 +4105,15 @@
                         <a:defRPr sz="2500" b="1"/>
                       </a:pPr>
                       <a:r>
-                        <a:t>Efter Sirius</a:t>
+                        <a:t>5</a:t>
                       </a:r>
                     </a:p>
                   </a:txBody>
-                  <a:tcPr anchor="ctr"/>
-                </a:tc>
-              </a:tr>
-              <a:tr h="1219200">
-                <a:tc>
-                  <a:txBody>
-                    <a:bodyPr/>
-                    <a:lstStyle/>
-                    <a:p>
-                      <a:pPr algn="ctr">
-                        <a:defRPr sz="2500" b="1"/>
-                      </a:pPr>
-                      <a:r>
-                        <a:t>Före Villa</a:t>
-                      </a:r>
-                    </a:p>
-                  </a:txBody>
-                  <a:tcPr anchor="ctr"/>
+                  <a:tcPr anchor="ctr">
+                    <a:solidFill>
+                      <a:srgbClr val="204498"/>
+                    </a:solidFill>
+                  </a:tcPr>
                 </a:tc>
                 <a:tc>
                   <a:txBody>
@@ -3970,73 +4130,7 @@
                   </a:txBody>
                   <a:tcPr anchor="ctr">
                     <a:solidFill>
-                      <a:srgbClr val="009ADE"/>
-                    </a:solidFill>
-                  </a:tcPr>
-                </a:tc>
-                <a:tc>
-                  <a:txBody>
-                    <a:bodyPr/>
-                    <a:lstStyle/>
-                    <a:p>
-                      <a:pPr algn="ctr">
-                        <a:defRPr sz="2500" b="1"/>
-                      </a:pPr>
-                      <a:r>
-                        <a:t>5</a:t>
-                      </a:r>
-                    </a:p>
-                  </a:txBody>
-                  <a:tcPr anchor="ctr"/>
-                </a:tc>
-              </a:tr>
-              <a:tr h="1219200">
-                <a:tc>
-                  <a:txBody>
-                    <a:bodyPr/>
-                    <a:lstStyle/>
-                    <a:p>
-                      <a:pPr algn="ctr">
-                        <a:defRPr sz="2500" b="1"/>
-                      </a:pPr>
-                      <a:r>
-                        <a:t>Före Sirius</a:t>
-                      </a:r>
-                    </a:p>
-                  </a:txBody>
-                  <a:tcPr anchor="ctr"/>
-                </a:tc>
-                <a:tc>
-                  <a:txBody>
-                    <a:bodyPr/>
-                    <a:lstStyle/>
-                    <a:p>
-                      <a:pPr algn="ctr">
-                        <a:defRPr sz="2500" b="1"/>
-                      </a:pPr>
-                      <a:r>
-                        <a:t>6</a:t>
-                      </a:r>
-                    </a:p>
-                  </a:txBody>
-                  <a:tcPr anchor="ctr"/>
-                </a:tc>
-                <a:tc>
-                  <a:txBody>
-                    <a:bodyPr/>
-                    <a:lstStyle/>
-                    <a:p>
-                      <a:pPr algn="ctr">
-                        <a:defRPr sz="2500" b="1"/>
-                      </a:pPr>
-                      <a:r>
-                        <a:t>1</a:t>
-                      </a:r>
-                    </a:p>
-                  </a:txBody>
-                  <a:tcPr anchor="ctr">
-                    <a:solidFill>
-                      <a:srgbClr val="009ADE"/>
+                      <a:srgbClr val="56569C"/>
                     </a:solidFill>
                   </a:tcPr>
                 </a:tc>
@@ -4056,14 +4150,6 @@
 <file path=ppt/slides/slide5.xml><?xml version="1.0" encoding="utf-8"?>
 <p:sld xmlns:a="http://schemas.openxmlformats.org/drawingml/2006/main" xmlns:p="http://schemas.openxmlformats.org/presentationml/2006/main" xmlns:r="http://schemas.openxmlformats.org/officeDocument/2006/relationships">
   <p:cSld>
-    <p:bg>
-      <p:bgPr>
-        <a:solidFill>
-          <a:srgbClr val="BEBEBE"/>
-        </a:solidFill>
-        <a:effectLst/>
-      </p:bgPr>
-    </p:bg>
     <p:spTree>
       <p:nvGrpSpPr>
         <p:cNvPr id="1" name=""/>
@@ -4071,221 +4157,9 @@
         <p:nvPr/>
       </p:nvGrpSpPr>
       <p:grpSpPr/>
-      <p:sp>
-        <p:nvSpPr>
-          <p:cNvPr id="2" name="Title 1"/>
-          <p:cNvSpPr>
-            <a:spLocks noGrp="1"/>
-          </p:cNvSpPr>
-          <p:nvPr>
-            <p:ph type="title"/>
-          </p:nvPr>
-        </p:nvSpPr>
-        <p:spPr/>
-        <p:txBody>
-          <a:bodyPr/>
-          <a:lstStyle/>
-          <a:p>
-            <a:r>
-              <a:t>Skottstatistik </a:t>
-            </a:r>
-          </a:p>
-          <a:p>
-            <a:r>
-              <a:t>Skotttyper</a:t>
-            </a:r>
-          </a:p>
-        </p:txBody>
-      </p:sp>
-      <p:sp>
-        <p:nvSpPr>
-          <p:cNvPr id="3" name="Text Placeholder 2"/>
-          <p:cNvSpPr>
-            <a:spLocks noGrp="1"/>
-          </p:cNvSpPr>
-          <p:nvPr>
-            <p:ph type="body" idx="1"/>
-          </p:nvPr>
-        </p:nvSpPr>
-        <p:spPr/>
-        <p:txBody>
-          <a:bodyPr/>
-          <a:lstStyle/>
-          <a:p>
-            <a:pPr>
-              <a:defRPr>
-                <a:solidFill>
-                  <a:srgbClr val="FFFEFE"/>
-                </a:solidFill>
-              </a:defRPr>
-            </a:pPr>
-            <a:r>
-              <a:t>Villa - skottförsök: 6</a:t>
-            </a:r>
-          </a:p>
-        </p:txBody>
-      </p:sp>
-      <p:sp>
-        <p:nvSpPr>
-          <p:cNvPr id="4" name="Content Placeholder 3"/>
-          <p:cNvSpPr>
-            <a:spLocks noGrp="1"/>
-          </p:cNvSpPr>
-          <p:nvPr>
-            <p:ph idx="2" sz="half"/>
-          </p:nvPr>
-        </p:nvSpPr>
-        <p:spPr/>
-        <p:txBody>
-          <a:bodyPr/>
-          <a:lstStyle/>
-          <a:p/>
-          <a:p>
-            <a:pPr>
-              <a:defRPr>
-                <a:solidFill>
-                  <a:srgbClr val="FFFEFE"/>
-                </a:solidFill>
-              </a:defRPr>
-            </a:pPr>
-            <a:r>
-              <a:t>Centralt: 3</a:t>
-            </a:r>
-          </a:p>
-          <a:p>
-            <a:pPr>
-              <a:defRPr>
-                <a:solidFill>
-                  <a:srgbClr val="FFFEFE"/>
-                </a:solidFill>
-              </a:defRPr>
-            </a:pPr>
-            <a:r>
-              <a:t>Dribbling: 1</a:t>
-            </a:r>
-          </a:p>
-          <a:p>
-            <a:pPr>
-              <a:defRPr>
-                <a:solidFill>
-                  <a:srgbClr val="FFFEFE"/>
-                </a:solidFill>
-              </a:defRPr>
-            </a:pPr>
-            <a:r>
-              <a:t>Inlägg: 2</a:t>
-            </a:r>
-          </a:p>
-          <a:p>
-            <a:pPr>
-              <a:defRPr>
-                <a:solidFill>
-                  <a:srgbClr val="FFFEFE"/>
-                </a:solidFill>
-              </a:defRPr>
-            </a:pPr>
-            <a:r>
-              <a:t>Utifrån: 0</a:t>
-            </a:r>
-          </a:p>
-        </p:txBody>
-      </p:sp>
-      <p:sp>
-        <p:nvSpPr>
-          <p:cNvPr id="5" name="Text Placeholder 4"/>
-          <p:cNvSpPr>
-            <a:spLocks noGrp="1"/>
-          </p:cNvSpPr>
-          <p:nvPr>
-            <p:ph type="body" idx="3" sz="quarter"/>
-          </p:nvPr>
-        </p:nvSpPr>
-        <p:spPr/>
-        <p:txBody>
-          <a:bodyPr/>
-          <a:lstStyle/>
-          <a:p>
-            <a:pPr>
-              <a:defRPr>
-                <a:solidFill>
-                  <a:srgbClr val="000000"/>
-                </a:solidFill>
-              </a:defRPr>
-            </a:pPr>
-            <a:r>
-              <a:t>Sirius - skottförsök: 4</a:t>
-            </a:r>
-          </a:p>
-        </p:txBody>
-      </p:sp>
-      <p:sp>
-        <p:nvSpPr>
-          <p:cNvPr id="6" name="Content Placeholder 5"/>
-          <p:cNvSpPr>
-            <a:spLocks noGrp="1"/>
-          </p:cNvSpPr>
-          <p:nvPr>
-            <p:ph idx="4" sz="quarter"/>
-          </p:nvPr>
-        </p:nvSpPr>
-        <p:spPr/>
-        <p:txBody>
-          <a:bodyPr/>
-          <a:lstStyle/>
-          <a:p/>
-          <a:p>
-            <a:pPr>
-              <a:defRPr>
-                <a:solidFill>
-                  <a:srgbClr val="000000"/>
-                </a:solidFill>
-              </a:defRPr>
-            </a:pPr>
-            <a:r>
-              <a:t>Centralt: 1</a:t>
-            </a:r>
-          </a:p>
-          <a:p>
-            <a:pPr>
-              <a:defRPr>
-                <a:solidFill>
-                  <a:srgbClr val="000000"/>
-                </a:solidFill>
-              </a:defRPr>
-            </a:pPr>
-            <a:r>
-              <a:t>Dribbling: 0</a:t>
-            </a:r>
-          </a:p>
-          <a:p>
-            <a:pPr>
-              <a:defRPr>
-                <a:solidFill>
-                  <a:srgbClr val="000000"/>
-                </a:solidFill>
-              </a:defRPr>
-            </a:pPr>
-            <a:r>
-              <a:t>Inlägg: 1</a:t>
-            </a:r>
-          </a:p>
-          <a:p>
-            <a:pPr>
-              <a:defRPr>
-                <a:solidFill>
-                  <a:srgbClr val="000000"/>
-                </a:solidFill>
-              </a:defRPr>
-            </a:pPr>
-            <a:r>
-              <a:t>Utifrån: 2</a:t>
-            </a:r>
-          </a:p>
-        </p:txBody>
-      </p:sp>
       <p:pic>
         <p:nvPicPr>
-          <p:cNvPr id="7" name="Picture 6" descr="villa logo.png"/>
+          <p:cNvPr id="7" name="Picture 6" descr="background.png"/>
           <p:cNvPicPr>
             <a:picLocks noChangeAspect="1"/>
           </p:cNvPicPr>
@@ -4293,6 +4167,242 @@
         </p:nvPicPr>
         <p:blipFill>
           <a:blip r:embed="rId2"/>
+          <a:stretch>
+            <a:fillRect/>
+          </a:stretch>
+        </p:blipFill>
+        <p:spPr>
+          <a:xfrm>
+            <a:off x="0" y="0"/>
+            <a:ext cx="9144000" cy="6858000"/>
+          </a:xfrm>
+          <a:prstGeom prst="rect">
+            <a:avLst/>
+          </a:prstGeom>
+        </p:spPr>
+      </p:pic>
+      <p:sp>
+        <p:nvSpPr>
+          <p:cNvPr id="2" name="Title 1"/>
+          <p:cNvSpPr>
+            <a:spLocks noGrp="1"/>
+          </p:cNvSpPr>
+          <p:nvPr>
+            <p:ph type="title"/>
+          </p:nvPr>
+        </p:nvSpPr>
+        <p:spPr/>
+        <p:txBody>
+          <a:bodyPr/>
+          <a:lstStyle/>
+          <a:p>
+            <a:r>
+              <a:t>Skottstatistik </a:t>
+            </a:r>
+          </a:p>
+          <a:p>
+            <a:r>
+              <a:t>Skotttyper</a:t>
+            </a:r>
+          </a:p>
+        </p:txBody>
+      </p:sp>
+      <p:sp>
+        <p:nvSpPr>
+          <p:cNvPr id="3" name="Text Placeholder 2"/>
+          <p:cNvSpPr>
+            <a:spLocks noGrp="1"/>
+          </p:cNvSpPr>
+          <p:nvPr>
+            <p:ph type="body" idx="1"/>
+          </p:nvPr>
+        </p:nvSpPr>
+        <p:spPr/>
+        <p:txBody>
+          <a:bodyPr/>
+          <a:lstStyle/>
+          <a:p>
+            <a:pPr>
+              <a:defRPr>
+                <a:solidFill>
+                  <a:srgbClr val="000000"/>
+                </a:solidFill>
+              </a:defRPr>
+            </a:pPr>
+            <a:r>
+              <a:t>Sirius - skottförsök: 4</a:t>
+            </a:r>
+          </a:p>
+        </p:txBody>
+      </p:sp>
+      <p:sp>
+        <p:nvSpPr>
+          <p:cNvPr id="4" name="Content Placeholder 3"/>
+          <p:cNvSpPr>
+            <a:spLocks noGrp="1"/>
+          </p:cNvSpPr>
+          <p:nvPr>
+            <p:ph idx="2" sz="half"/>
+          </p:nvPr>
+        </p:nvSpPr>
+        <p:spPr/>
+        <p:txBody>
+          <a:bodyPr/>
+          <a:lstStyle/>
+          <a:p/>
+          <a:p>
+            <a:pPr>
+              <a:defRPr>
+                <a:solidFill>
+                  <a:srgbClr val="000000"/>
+                </a:solidFill>
+              </a:defRPr>
+            </a:pPr>
+            <a:r>
+              <a:t>Centralt: 1</a:t>
+            </a:r>
+          </a:p>
+          <a:p>
+            <a:pPr>
+              <a:defRPr>
+                <a:solidFill>
+                  <a:srgbClr val="000000"/>
+                </a:solidFill>
+              </a:defRPr>
+            </a:pPr>
+            <a:r>
+              <a:t>Dribbling: 0</a:t>
+            </a:r>
+          </a:p>
+          <a:p>
+            <a:pPr>
+              <a:defRPr>
+                <a:solidFill>
+                  <a:srgbClr val="000000"/>
+                </a:solidFill>
+              </a:defRPr>
+            </a:pPr>
+            <a:r>
+              <a:t>Inlägg: 1</a:t>
+            </a:r>
+          </a:p>
+          <a:p>
+            <a:pPr>
+              <a:defRPr>
+                <a:solidFill>
+                  <a:srgbClr val="000000"/>
+                </a:solidFill>
+              </a:defRPr>
+            </a:pPr>
+            <a:r>
+              <a:t>Utifrån: 2</a:t>
+            </a:r>
+          </a:p>
+        </p:txBody>
+      </p:sp>
+      <p:sp>
+        <p:nvSpPr>
+          <p:cNvPr id="5" name="Text Placeholder 4"/>
+          <p:cNvSpPr>
+            <a:spLocks noGrp="1"/>
+          </p:cNvSpPr>
+          <p:nvPr>
+            <p:ph type="body" idx="3" sz="quarter"/>
+          </p:nvPr>
+        </p:nvSpPr>
+        <p:spPr/>
+        <p:txBody>
+          <a:bodyPr/>
+          <a:lstStyle/>
+          <a:p>
+            <a:pPr>
+              <a:defRPr>
+                <a:solidFill>
+                  <a:srgbClr val="FFFEFE"/>
+                </a:solidFill>
+              </a:defRPr>
+            </a:pPr>
+            <a:r>
+              <a:t>Villa Lidköping - skottförsök: 6</a:t>
+            </a:r>
+          </a:p>
+        </p:txBody>
+      </p:sp>
+      <p:sp>
+        <p:nvSpPr>
+          <p:cNvPr id="6" name="Content Placeholder 5"/>
+          <p:cNvSpPr>
+            <a:spLocks noGrp="1"/>
+          </p:cNvSpPr>
+          <p:nvPr>
+            <p:ph idx="4" sz="quarter"/>
+          </p:nvPr>
+        </p:nvSpPr>
+        <p:spPr/>
+        <p:txBody>
+          <a:bodyPr/>
+          <a:lstStyle/>
+          <a:p/>
+          <a:p>
+            <a:pPr>
+              <a:defRPr>
+                <a:solidFill>
+                  <a:srgbClr val="FFFEFE"/>
+                </a:solidFill>
+              </a:defRPr>
+            </a:pPr>
+            <a:r>
+              <a:t>Centralt: 3</a:t>
+            </a:r>
+          </a:p>
+          <a:p>
+            <a:pPr>
+              <a:defRPr>
+                <a:solidFill>
+                  <a:srgbClr val="FFFEFE"/>
+                </a:solidFill>
+              </a:defRPr>
+            </a:pPr>
+            <a:r>
+              <a:t>Dribbling: 1</a:t>
+            </a:r>
+          </a:p>
+          <a:p>
+            <a:pPr>
+              <a:defRPr>
+                <a:solidFill>
+                  <a:srgbClr val="FFFEFE"/>
+                </a:solidFill>
+              </a:defRPr>
+            </a:pPr>
+            <a:r>
+              <a:t>Inlägg: 2</a:t>
+            </a:r>
+          </a:p>
+          <a:p>
+            <a:pPr>
+              <a:defRPr>
+                <a:solidFill>
+                  <a:srgbClr val="FFFEFE"/>
+                </a:solidFill>
+              </a:defRPr>
+            </a:pPr>
+            <a:r>
+              <a:t>Utifrån: 0</a:t>
+            </a:r>
+          </a:p>
+        </p:txBody>
+      </p:sp>
+      <p:pic>
+        <p:nvPicPr>
+          <p:cNvPr id="8" name="Picture 7" descr="sirius logo.png"/>
+          <p:cNvPicPr>
+            <a:picLocks noChangeAspect="1"/>
+          </p:cNvPicPr>
+          <p:nvPr/>
+        </p:nvPicPr>
+        <p:blipFill>
+          <a:blip r:embed="rId3"/>
           <a:stretch>
             <a:fillRect/>
           </a:stretch>
@@ -4309,14 +4419,14 @@
       </p:pic>
       <p:pic>
         <p:nvPicPr>
-          <p:cNvPr id="8" name="Picture 7" descr="sirius logo.png"/>
+          <p:cNvPr id="9" name="Picture 8" descr="villa logo.png"/>
           <p:cNvPicPr>
             <a:picLocks noChangeAspect="1"/>
           </p:cNvPicPr>
           <p:nvPr/>
         </p:nvPicPr>
         <p:blipFill>
-          <a:blip r:embed="rId3"/>
+          <a:blip r:embed="rId4"/>
           <a:stretch>
             <a:fillRect/>
           </a:stretch>
@@ -4342,14 +4452,6 @@
 <file path=ppt/slides/slide6.xml><?xml version="1.0" encoding="utf-8"?>
 <p:sld xmlns:a="http://schemas.openxmlformats.org/drawingml/2006/main" xmlns:p="http://schemas.openxmlformats.org/presentationml/2006/main" xmlns:r="http://schemas.openxmlformats.org/officeDocument/2006/relationships">
   <p:cSld>
-    <p:bg>
-      <p:bgPr>
-        <a:solidFill>
-          <a:srgbClr val="BEBEBE"/>
-        </a:solidFill>
-        <a:effectLst/>
-      </p:bgPr>
-    </p:bg>
     <p:spTree>
       <p:nvGrpSpPr>
         <p:cNvPr id="1" name=""/>
@@ -4357,293 +4459,9 @@
         <p:nvPr/>
       </p:nvGrpSpPr>
       <p:grpSpPr/>
-      <p:sp>
-        <p:nvSpPr>
-          <p:cNvPr id="2" name="Title 1"/>
-          <p:cNvSpPr>
-            <a:spLocks noGrp="1"/>
-          </p:cNvSpPr>
-          <p:nvPr>
-            <p:ph type="title"/>
-          </p:nvPr>
-        </p:nvSpPr>
-        <p:spPr/>
-        <p:txBody>
-          <a:bodyPr/>
-          <a:lstStyle/>
-          <a:p>
-            <a:r>
-              <a:t>Skottstatistik </a:t>
-            </a:r>
-          </a:p>
-          <a:p>
-            <a:r>
-              <a:t>Skottens ursprung</a:t>
-            </a:r>
-          </a:p>
-        </p:txBody>
-      </p:sp>
-      <p:sp>
-        <p:nvSpPr>
-          <p:cNvPr id="3" name="Text Placeholder 2"/>
-          <p:cNvSpPr>
-            <a:spLocks noGrp="1"/>
-          </p:cNvSpPr>
-          <p:nvPr>
-            <p:ph type="body" idx="1"/>
-          </p:nvPr>
-        </p:nvSpPr>
-        <p:spPr/>
-        <p:txBody>
-          <a:bodyPr/>
-          <a:lstStyle/>
-          <a:p>
-            <a:pPr>
-              <a:defRPr>
-                <a:solidFill>
-                  <a:srgbClr val="FFFEFE"/>
-                </a:solidFill>
-              </a:defRPr>
-            </a:pPr>
-            <a:r>
-              <a:t>Villa - skottförsök: 11</a:t>
-            </a:r>
-          </a:p>
-        </p:txBody>
-      </p:sp>
-      <p:sp>
-        <p:nvSpPr>
-          <p:cNvPr id="4" name="Content Placeholder 3"/>
-          <p:cNvSpPr>
-            <a:spLocks noGrp="1"/>
-          </p:cNvSpPr>
-          <p:nvPr>
-            <p:ph idx="2" sz="half"/>
-          </p:nvPr>
-        </p:nvSpPr>
-        <p:spPr/>
-        <p:txBody>
-          <a:bodyPr/>
-          <a:lstStyle/>
-          <a:p/>
-          <a:p>
-            <a:pPr>
-              <a:defRPr>
-                <a:solidFill>
-                  <a:srgbClr val="FFFEFE"/>
-                </a:solidFill>
-              </a:defRPr>
-            </a:pPr>
-            <a:r>
-              <a:t>Boll: 0</a:t>
-            </a:r>
-          </a:p>
-          <a:p>
-            <a:pPr>
-              <a:defRPr>
-                <a:solidFill>
-                  <a:srgbClr val="FFFEFE"/>
-                </a:solidFill>
-              </a:defRPr>
-            </a:pPr>
-            <a:r>
-              <a:t>Bolltapp: 2</a:t>
-            </a:r>
-          </a:p>
-          <a:p>
-            <a:pPr>
-              <a:defRPr>
-                <a:solidFill>
-                  <a:srgbClr val="FFFEFE"/>
-                </a:solidFill>
-              </a:defRPr>
-            </a:pPr>
-            <a:r>
-              <a:t>Frislag: 0</a:t>
-            </a:r>
-          </a:p>
-          <a:p>
-            <a:pPr>
-              <a:defRPr>
-                <a:solidFill>
-                  <a:srgbClr val="FFFEFE"/>
-                </a:solidFill>
-              </a:defRPr>
-            </a:pPr>
-            <a:r>
-              <a:t>Hörna: 6</a:t>
-            </a:r>
-          </a:p>
-          <a:p>
-            <a:pPr>
-              <a:defRPr>
-                <a:solidFill>
-                  <a:srgbClr val="FFFEFE"/>
-                </a:solidFill>
-              </a:defRPr>
-            </a:pPr>
-            <a:r>
-              <a:t>Inslag: 1</a:t>
-            </a:r>
-          </a:p>
-          <a:p>
-            <a:pPr>
-              <a:defRPr>
-                <a:solidFill>
-                  <a:srgbClr val="FFFEFE"/>
-                </a:solidFill>
-              </a:defRPr>
-            </a:pPr>
-            <a:r>
-              <a:t>Offside: 0</a:t>
-            </a:r>
-          </a:p>
-          <a:p>
-            <a:pPr>
-              <a:defRPr>
-                <a:solidFill>
-                  <a:srgbClr val="FFFEFE"/>
-                </a:solidFill>
-              </a:defRPr>
-            </a:pPr>
-            <a:r>
-              <a:t>Utkast: 2</a:t>
-            </a:r>
-          </a:p>
-        </p:txBody>
-      </p:sp>
-      <p:sp>
-        <p:nvSpPr>
-          <p:cNvPr id="5" name="Text Placeholder 4"/>
-          <p:cNvSpPr>
-            <a:spLocks noGrp="1"/>
-          </p:cNvSpPr>
-          <p:nvPr>
-            <p:ph type="body" idx="3" sz="quarter"/>
-          </p:nvPr>
-        </p:nvSpPr>
-        <p:spPr/>
-        <p:txBody>
-          <a:bodyPr/>
-          <a:lstStyle/>
-          <a:p>
-            <a:pPr>
-              <a:defRPr>
-                <a:solidFill>
-                  <a:srgbClr val="000000"/>
-                </a:solidFill>
-              </a:defRPr>
-            </a:pPr>
-            <a:r>
-              <a:t>Sirius - skottförsök: 9</a:t>
-            </a:r>
-          </a:p>
-        </p:txBody>
-      </p:sp>
-      <p:sp>
-        <p:nvSpPr>
-          <p:cNvPr id="6" name="Content Placeholder 5"/>
-          <p:cNvSpPr>
-            <a:spLocks noGrp="1"/>
-          </p:cNvSpPr>
-          <p:nvPr>
-            <p:ph idx="4" sz="quarter"/>
-          </p:nvPr>
-        </p:nvSpPr>
-        <p:spPr/>
-        <p:txBody>
-          <a:bodyPr/>
-          <a:lstStyle/>
-          <a:p/>
-          <a:p>
-            <a:pPr>
-              <a:defRPr>
-                <a:solidFill>
-                  <a:srgbClr val="000000"/>
-                </a:solidFill>
-              </a:defRPr>
-            </a:pPr>
-            <a:r>
-              <a:t>Boll: 1</a:t>
-            </a:r>
-          </a:p>
-          <a:p>
-            <a:pPr>
-              <a:defRPr>
-                <a:solidFill>
-                  <a:srgbClr val="000000"/>
-                </a:solidFill>
-              </a:defRPr>
-            </a:pPr>
-            <a:r>
-              <a:t>Bolltapp: 0</a:t>
-            </a:r>
-          </a:p>
-          <a:p>
-            <a:pPr>
-              <a:defRPr>
-                <a:solidFill>
-                  <a:srgbClr val="000000"/>
-                </a:solidFill>
-              </a:defRPr>
-            </a:pPr>
-            <a:r>
-              <a:t>Frislag: 1</a:t>
-            </a:r>
-          </a:p>
-          <a:p>
-            <a:pPr>
-              <a:defRPr>
-                <a:solidFill>
-                  <a:srgbClr val="000000"/>
-                </a:solidFill>
-              </a:defRPr>
-            </a:pPr>
-            <a:r>
-              <a:t>Hörna: 6</a:t>
-            </a:r>
-          </a:p>
-          <a:p>
-            <a:pPr>
-              <a:defRPr>
-                <a:solidFill>
-                  <a:srgbClr val="000000"/>
-                </a:solidFill>
-              </a:defRPr>
-            </a:pPr>
-            <a:r>
-              <a:t>Inslag: 0</a:t>
-            </a:r>
-          </a:p>
-          <a:p>
-            <a:pPr>
-              <a:defRPr>
-                <a:solidFill>
-                  <a:srgbClr val="000000"/>
-                </a:solidFill>
-              </a:defRPr>
-            </a:pPr>
-            <a:r>
-              <a:t>Offside: 1</a:t>
-            </a:r>
-          </a:p>
-          <a:p>
-            <a:pPr>
-              <a:defRPr>
-                <a:solidFill>
-                  <a:srgbClr val="000000"/>
-                </a:solidFill>
-              </a:defRPr>
-            </a:pPr>
-            <a:r>
-              <a:t>Utkast: 0</a:t>
-            </a:r>
-          </a:p>
-        </p:txBody>
-      </p:sp>
       <p:pic>
         <p:nvPicPr>
-          <p:cNvPr id="7" name="Picture 6" descr="villa logo.png"/>
+          <p:cNvPr id="7" name="Picture 6" descr="background.png"/>
           <p:cNvPicPr>
             <a:picLocks noChangeAspect="1"/>
           </p:cNvPicPr>
@@ -4651,6 +4469,314 @@
         </p:nvPicPr>
         <p:blipFill>
           <a:blip r:embed="rId2"/>
+          <a:stretch>
+            <a:fillRect/>
+          </a:stretch>
+        </p:blipFill>
+        <p:spPr>
+          <a:xfrm>
+            <a:off x="0" y="0"/>
+            <a:ext cx="9144000" cy="6858000"/>
+          </a:xfrm>
+          <a:prstGeom prst="rect">
+            <a:avLst/>
+          </a:prstGeom>
+        </p:spPr>
+      </p:pic>
+      <p:sp>
+        <p:nvSpPr>
+          <p:cNvPr id="2" name="Title 1"/>
+          <p:cNvSpPr>
+            <a:spLocks noGrp="1"/>
+          </p:cNvSpPr>
+          <p:nvPr>
+            <p:ph type="title"/>
+          </p:nvPr>
+        </p:nvSpPr>
+        <p:spPr/>
+        <p:txBody>
+          <a:bodyPr/>
+          <a:lstStyle/>
+          <a:p>
+            <a:r>
+              <a:t>Skottstatistik </a:t>
+            </a:r>
+          </a:p>
+          <a:p>
+            <a:r>
+              <a:t>Skottens ursprung</a:t>
+            </a:r>
+          </a:p>
+        </p:txBody>
+      </p:sp>
+      <p:sp>
+        <p:nvSpPr>
+          <p:cNvPr id="3" name="Text Placeholder 2"/>
+          <p:cNvSpPr>
+            <a:spLocks noGrp="1"/>
+          </p:cNvSpPr>
+          <p:nvPr>
+            <p:ph type="body" idx="1"/>
+          </p:nvPr>
+        </p:nvSpPr>
+        <p:spPr/>
+        <p:txBody>
+          <a:bodyPr/>
+          <a:lstStyle/>
+          <a:p>
+            <a:pPr>
+              <a:defRPr>
+                <a:solidFill>
+                  <a:srgbClr val="000000"/>
+                </a:solidFill>
+              </a:defRPr>
+            </a:pPr>
+            <a:r>
+              <a:t>Sirius - skottförsök: 9</a:t>
+            </a:r>
+          </a:p>
+        </p:txBody>
+      </p:sp>
+      <p:sp>
+        <p:nvSpPr>
+          <p:cNvPr id="4" name="Content Placeholder 3"/>
+          <p:cNvSpPr>
+            <a:spLocks noGrp="1"/>
+          </p:cNvSpPr>
+          <p:nvPr>
+            <p:ph idx="2" sz="half"/>
+          </p:nvPr>
+        </p:nvSpPr>
+        <p:spPr/>
+        <p:txBody>
+          <a:bodyPr/>
+          <a:lstStyle/>
+          <a:p/>
+          <a:p>
+            <a:pPr>
+              <a:defRPr>
+                <a:solidFill>
+                  <a:srgbClr val="000000"/>
+                </a:solidFill>
+              </a:defRPr>
+            </a:pPr>
+            <a:r>
+              <a:t>Boll: 1</a:t>
+            </a:r>
+          </a:p>
+          <a:p>
+            <a:pPr>
+              <a:defRPr>
+                <a:solidFill>
+                  <a:srgbClr val="000000"/>
+                </a:solidFill>
+              </a:defRPr>
+            </a:pPr>
+            <a:r>
+              <a:t>Bolltapp: 0</a:t>
+            </a:r>
+          </a:p>
+          <a:p>
+            <a:pPr>
+              <a:defRPr>
+                <a:solidFill>
+                  <a:srgbClr val="000000"/>
+                </a:solidFill>
+              </a:defRPr>
+            </a:pPr>
+            <a:r>
+              <a:t>Frislag: 1</a:t>
+            </a:r>
+          </a:p>
+          <a:p>
+            <a:pPr>
+              <a:defRPr>
+                <a:solidFill>
+                  <a:srgbClr val="000000"/>
+                </a:solidFill>
+              </a:defRPr>
+            </a:pPr>
+            <a:r>
+              <a:t>Hörna: 6</a:t>
+            </a:r>
+          </a:p>
+          <a:p>
+            <a:pPr>
+              <a:defRPr>
+                <a:solidFill>
+                  <a:srgbClr val="000000"/>
+                </a:solidFill>
+              </a:defRPr>
+            </a:pPr>
+            <a:r>
+              <a:t>Inslag: 0</a:t>
+            </a:r>
+          </a:p>
+          <a:p>
+            <a:pPr>
+              <a:defRPr>
+                <a:solidFill>
+                  <a:srgbClr val="000000"/>
+                </a:solidFill>
+              </a:defRPr>
+            </a:pPr>
+            <a:r>
+              <a:t>Offside: 1</a:t>
+            </a:r>
+          </a:p>
+          <a:p>
+            <a:pPr>
+              <a:defRPr>
+                <a:solidFill>
+                  <a:srgbClr val="000000"/>
+                </a:solidFill>
+              </a:defRPr>
+            </a:pPr>
+            <a:r>
+              <a:t>Utkast: 0</a:t>
+            </a:r>
+          </a:p>
+        </p:txBody>
+      </p:sp>
+      <p:sp>
+        <p:nvSpPr>
+          <p:cNvPr id="5" name="Text Placeholder 4"/>
+          <p:cNvSpPr>
+            <a:spLocks noGrp="1"/>
+          </p:cNvSpPr>
+          <p:nvPr>
+            <p:ph type="body" idx="3" sz="quarter"/>
+          </p:nvPr>
+        </p:nvSpPr>
+        <p:spPr/>
+        <p:txBody>
+          <a:bodyPr/>
+          <a:lstStyle/>
+          <a:p>
+            <a:pPr>
+              <a:defRPr>
+                <a:solidFill>
+                  <a:srgbClr val="FFFEFE"/>
+                </a:solidFill>
+              </a:defRPr>
+            </a:pPr>
+            <a:r>
+              <a:t>Villa Lidköping - skottförsök: 11</a:t>
+            </a:r>
+          </a:p>
+        </p:txBody>
+      </p:sp>
+      <p:sp>
+        <p:nvSpPr>
+          <p:cNvPr id="6" name="Content Placeholder 5"/>
+          <p:cNvSpPr>
+            <a:spLocks noGrp="1"/>
+          </p:cNvSpPr>
+          <p:nvPr>
+            <p:ph idx="4" sz="quarter"/>
+          </p:nvPr>
+        </p:nvSpPr>
+        <p:spPr/>
+        <p:txBody>
+          <a:bodyPr/>
+          <a:lstStyle/>
+          <a:p/>
+          <a:p>
+            <a:pPr>
+              <a:defRPr>
+                <a:solidFill>
+                  <a:srgbClr val="FFFEFE"/>
+                </a:solidFill>
+              </a:defRPr>
+            </a:pPr>
+            <a:r>
+              <a:t>Boll: 0</a:t>
+            </a:r>
+          </a:p>
+          <a:p>
+            <a:pPr>
+              <a:defRPr>
+                <a:solidFill>
+                  <a:srgbClr val="FFFEFE"/>
+                </a:solidFill>
+              </a:defRPr>
+            </a:pPr>
+            <a:r>
+              <a:t>Bolltapp: 2</a:t>
+            </a:r>
+          </a:p>
+          <a:p>
+            <a:pPr>
+              <a:defRPr>
+                <a:solidFill>
+                  <a:srgbClr val="FFFEFE"/>
+                </a:solidFill>
+              </a:defRPr>
+            </a:pPr>
+            <a:r>
+              <a:t>Frislag: 0</a:t>
+            </a:r>
+          </a:p>
+          <a:p>
+            <a:pPr>
+              <a:defRPr>
+                <a:solidFill>
+                  <a:srgbClr val="FFFEFE"/>
+                </a:solidFill>
+              </a:defRPr>
+            </a:pPr>
+            <a:r>
+              <a:t>Hörna: 6</a:t>
+            </a:r>
+          </a:p>
+          <a:p>
+            <a:pPr>
+              <a:defRPr>
+                <a:solidFill>
+                  <a:srgbClr val="FFFEFE"/>
+                </a:solidFill>
+              </a:defRPr>
+            </a:pPr>
+            <a:r>
+              <a:t>Inslag: 1</a:t>
+            </a:r>
+          </a:p>
+          <a:p>
+            <a:pPr>
+              <a:defRPr>
+                <a:solidFill>
+                  <a:srgbClr val="FFFEFE"/>
+                </a:solidFill>
+              </a:defRPr>
+            </a:pPr>
+            <a:r>
+              <a:t>Offside: 0</a:t>
+            </a:r>
+          </a:p>
+          <a:p>
+            <a:pPr>
+              <a:defRPr>
+                <a:solidFill>
+                  <a:srgbClr val="FFFEFE"/>
+                </a:solidFill>
+              </a:defRPr>
+            </a:pPr>
+            <a:r>
+              <a:t>Utkast: 2</a:t>
+            </a:r>
+          </a:p>
+        </p:txBody>
+      </p:sp>
+      <p:pic>
+        <p:nvPicPr>
+          <p:cNvPr id="8" name="Picture 7" descr="sirius logo.png"/>
+          <p:cNvPicPr>
+            <a:picLocks noChangeAspect="1"/>
+          </p:cNvPicPr>
+          <p:nvPr/>
+        </p:nvPicPr>
+        <p:blipFill>
+          <a:blip r:embed="rId3"/>
           <a:stretch>
             <a:fillRect/>
           </a:stretch>
@@ -4667,14 +4793,14 @@
       </p:pic>
       <p:pic>
         <p:nvPicPr>
-          <p:cNvPr id="8" name="Picture 7" descr="sirius logo.png"/>
+          <p:cNvPr id="9" name="Picture 8" descr="villa logo.png"/>
           <p:cNvPicPr>
             <a:picLocks noChangeAspect="1"/>
           </p:cNvPicPr>
           <p:nvPr/>
         </p:nvPicPr>
         <p:blipFill>
-          <a:blip r:embed="rId3"/>
+          <a:blip r:embed="rId4"/>
           <a:stretch>
             <a:fillRect/>
           </a:stretch>
@@ -4700,14 +4826,6 @@
 <file path=ppt/slides/slide7.xml><?xml version="1.0" encoding="utf-8"?>
 <p:sld xmlns:a="http://schemas.openxmlformats.org/drawingml/2006/main" xmlns:p="http://schemas.openxmlformats.org/presentationml/2006/main" xmlns:r="http://schemas.openxmlformats.org/officeDocument/2006/relationships">
   <p:cSld>
-    <p:bg>
-      <p:bgPr>
-        <a:solidFill>
-          <a:srgbClr val="BEBEBE"/>
-        </a:solidFill>
-        <a:effectLst/>
-      </p:bgPr>
-    </p:bg>
     <p:spTree>
       <p:nvGrpSpPr>
         <p:cNvPr id="1" name=""/>
@@ -4715,95 +4833,9 @@
         <p:nvPr/>
       </p:nvGrpSpPr>
       <p:grpSpPr/>
-      <p:sp>
-        <p:nvSpPr>
-          <p:cNvPr id="2" name="Title 1"/>
-          <p:cNvSpPr>
-            <a:spLocks noGrp="1"/>
-          </p:cNvSpPr>
-          <p:nvPr>
-            <p:ph type="title"/>
-          </p:nvPr>
-        </p:nvSpPr>
-        <p:spPr/>
-        <p:txBody>
-          <a:bodyPr/>
-          <a:lstStyle/>
-          <a:p>
-            <a:r>
-              <a:t>Målen</a:t>
-            </a:r>
-          </a:p>
-        </p:txBody>
-      </p:sp>
-      <p:sp>
-        <p:nvSpPr>
-          <p:cNvPr id="3" name="Content Placeholder 2"/>
-          <p:cNvSpPr>
-            <a:spLocks noGrp="1"/>
-          </p:cNvSpPr>
-          <p:nvPr>
-            <p:ph idx="1"/>
-          </p:nvPr>
-        </p:nvSpPr>
-        <p:spPr/>
-        <p:txBody>
-          <a:bodyPr/>
-          <a:lstStyle/>
-          <a:p/>
-          <a:p>
-            <a:pPr>
-              <a:defRPr>
-                <a:solidFill>
-                  <a:srgbClr val="FFFEFE"/>
-                </a:solidFill>
-              </a:defRPr>
-            </a:pPr>
-            <a:r>
-              <a:t>0:03:10: bolltapp -&gt; inlägg på 32s.</a:t>
-            </a:r>
-          </a:p>
-          <a:p>
-            <a:pPr>
-              <a:defRPr>
-                <a:solidFill>
-                  <a:srgbClr val="FFFEFE"/>
-                </a:solidFill>
-              </a:defRPr>
-            </a:pPr>
-            <a:r>
-              <a:t>0:15:56: utkast -&gt; dribbling på 75s.</a:t>
-            </a:r>
-          </a:p>
-          <a:p>
-            <a:pPr>
-              <a:defRPr>
-                <a:solidFill>
-                  <a:srgbClr val="FFFEFE"/>
-                </a:solidFill>
-              </a:defRPr>
-            </a:pPr>
-            <a:r>
-              <a:t>0:19:13: hörna -&gt; centralt på 68s.</a:t>
-            </a:r>
-          </a:p>
-          <a:p>
-            <a:pPr>
-              <a:defRPr>
-                <a:solidFill>
-                  <a:srgbClr val="FFFEFE"/>
-                </a:solidFill>
-              </a:defRPr>
-            </a:pPr>
-            <a:r>
-              <a:t>0:24:19: hörna -&gt; 0 på 23s.</a:t>
-            </a:r>
-          </a:p>
-        </p:txBody>
-      </p:sp>
       <p:pic>
         <p:nvPicPr>
-          <p:cNvPr id="4" name="Picture 3" descr="villa logo.png"/>
+          <p:cNvPr id="4" name="Picture 3" descr="background.png"/>
           <p:cNvPicPr>
             <a:picLocks noChangeAspect="1"/>
           </p:cNvPicPr>
@@ -4811,6 +4843,116 @@
         </p:nvPicPr>
         <p:blipFill>
           <a:blip r:embed="rId2"/>
+          <a:stretch>
+            <a:fillRect/>
+          </a:stretch>
+        </p:blipFill>
+        <p:spPr>
+          <a:xfrm>
+            <a:off x="0" y="0"/>
+            <a:ext cx="9144000" cy="6858000"/>
+          </a:xfrm>
+          <a:prstGeom prst="rect">
+            <a:avLst/>
+          </a:prstGeom>
+        </p:spPr>
+      </p:pic>
+      <p:sp>
+        <p:nvSpPr>
+          <p:cNvPr id="2" name="Title 1"/>
+          <p:cNvSpPr>
+            <a:spLocks noGrp="1"/>
+          </p:cNvSpPr>
+          <p:nvPr>
+            <p:ph type="title"/>
+          </p:nvPr>
+        </p:nvSpPr>
+        <p:spPr/>
+        <p:txBody>
+          <a:bodyPr/>
+          <a:lstStyle/>
+          <a:p>
+            <a:r>
+              <a:t>Målen</a:t>
+            </a:r>
+          </a:p>
+        </p:txBody>
+      </p:sp>
+      <p:sp>
+        <p:nvSpPr>
+          <p:cNvPr id="3" name="Content Placeholder 2"/>
+          <p:cNvSpPr>
+            <a:spLocks noGrp="1"/>
+          </p:cNvSpPr>
+          <p:nvPr>
+            <p:ph idx="1"/>
+          </p:nvPr>
+        </p:nvSpPr>
+        <p:spPr/>
+        <p:txBody>
+          <a:bodyPr/>
+          <a:lstStyle/>
+          <a:p/>
+          <a:p>
+            <a:pPr>
+              <a:defRPr>
+                <a:solidFill>
+                  <a:srgbClr val="FFFEFE"/>
+                </a:solidFill>
+              </a:defRPr>
+            </a:pPr>
+            <a:r>
+              <a:t>0:03:10: bolltapp -&gt; inlägg på 32s.</a:t>
+            </a:r>
+          </a:p>
+          <a:p>
+            <a:pPr>
+              <a:defRPr>
+                <a:solidFill>
+                  <a:srgbClr val="FFFEFE"/>
+                </a:solidFill>
+              </a:defRPr>
+            </a:pPr>
+            <a:r>
+              <a:t>0:15:56: utkast -&gt; dribbling på 75s.</a:t>
+            </a:r>
+          </a:p>
+          <a:p>
+            <a:pPr>
+              <a:defRPr>
+                <a:solidFill>
+                  <a:srgbClr val="FFFEFE"/>
+                </a:solidFill>
+              </a:defRPr>
+            </a:pPr>
+            <a:r>
+              <a:t>0:19:13: hörna -&gt; centralt på 68s.</a:t>
+            </a:r>
+          </a:p>
+          <a:p>
+            <a:pPr>
+              <a:defRPr>
+                <a:solidFill>
+                  <a:srgbClr val="FFFEFE"/>
+                </a:solidFill>
+              </a:defRPr>
+            </a:pPr>
+            <a:r>
+              <a:t>0:24:19: hörna -&gt; 0 på 23s.</a:t>
+            </a:r>
+          </a:p>
+        </p:txBody>
+      </p:sp>
+      <p:pic>
+        <p:nvPicPr>
+          <p:cNvPr id="5" name="Picture 4" descr="sirius logo.png"/>
+          <p:cNvPicPr>
+            <a:picLocks noChangeAspect="1"/>
+          </p:cNvPicPr>
+          <p:nvPr/>
+        </p:nvPicPr>
+        <p:blipFill>
+          <a:blip r:embed="rId3"/>
           <a:stretch>
             <a:fillRect/>
           </a:stretch>
@@ -4827,14 +4969,14 @@
       </p:pic>
       <p:pic>
         <p:nvPicPr>
-          <p:cNvPr id="5" name="Picture 4" descr="sirius logo.png"/>
+          <p:cNvPr id="6" name="Picture 5" descr="villa logo.png"/>
           <p:cNvPicPr>
             <a:picLocks noChangeAspect="1"/>
           </p:cNvPicPr>
           <p:nvPr/>
         </p:nvPicPr>
         <p:blipFill>
-          <a:blip r:embed="rId3"/>
+          <a:blip r:embed="rId4"/>
           <a:stretch>
             <a:fillRect/>
           </a:stretch>

</xml_diff>